<commit_message>
Add RoomDataLoader and RoomType classes with CSV loading functionality
</commit_message>
<xml_diff>
--- a/Pitch Minguet.pptx
+++ b/Pitch Minguet.pptx
@@ -7,11 +7,12 @@
   <p:sldIdLst>
     <p:sldId id="262" r:id="rId2"/>
     <p:sldId id="258" r:id="rId3"/>
-    <p:sldId id="257" r:id="rId4"/>
-    <p:sldId id="259" r:id="rId5"/>
-    <p:sldId id="260" r:id="rId6"/>
-    <p:sldId id="261" r:id="rId7"/>
-    <p:sldId id="263" r:id="rId8"/>
+    <p:sldId id="265" r:id="rId4"/>
+    <p:sldId id="257" r:id="rId5"/>
+    <p:sldId id="259" r:id="rId6"/>
+    <p:sldId id="260" r:id="rId7"/>
+    <p:sldId id="261" r:id="rId8"/>
+    <p:sldId id="263" r:id="rId9"/>
   </p:sldIdLst>
   <p:sldSz cx="12192000" cy="6858000"/>
   <p:notesSz cx="6858000" cy="9144000"/>
@@ -110,6 +111,11 @@
       </a:defRPr>
     </a:lvl9pPr>
   </p:defaultTextStyle>
+  <p:extLst>
+    <p:ext uri="{EFAFB233-063F-42B5-8137-9DF3F51BA10A}">
+      <p15:sldGuideLst xmlns:p15="http://schemas.microsoft.com/office/powerpoint/2012/main"/>
+    </p:ext>
+  </p:extLst>
 </p:presentation>
 </file>
 
@@ -6966,7 +6972,7 @@
           <a:p>
             <a:fld id="{C139B7E4-65CE-45E0-B612-BB2CFA1ABD80}" type="datetimeFigureOut">
               <a:rPr lang="en-US" smtClean="0"/>
-              <a:t>11/1/2024</a:t>
+              <a:t>11/3/2024</a:t>
             </a:fld>
             <a:endParaRPr lang="en-US"/>
           </a:p>
@@ -7128,7 +7134,7 @@
           <a:p>
             <a:fld id="{C139B7E4-65CE-45E0-B612-BB2CFA1ABD80}" type="datetimeFigureOut">
               <a:rPr lang="en-US" smtClean="0"/>
-              <a:t>11/1/2024</a:t>
+              <a:t>11/3/2024</a:t>
             </a:fld>
             <a:endParaRPr lang="en-US"/>
           </a:p>
@@ -7356,7 +7362,7 @@
           <a:p>
             <a:fld id="{C139B7E4-65CE-45E0-B612-BB2CFA1ABD80}" type="datetimeFigureOut">
               <a:rPr lang="en-US" smtClean="0"/>
-              <a:t>11/1/2024</a:t>
+              <a:t>11/3/2024</a:t>
             </a:fld>
             <a:endParaRPr lang="en-US"/>
           </a:p>
@@ -7584,7 +7590,7 @@
           <a:p>
             <a:fld id="{C139B7E4-65CE-45E0-B612-BB2CFA1ABD80}" type="datetimeFigureOut">
               <a:rPr lang="en-US" smtClean="0"/>
-              <a:t>11/1/2024</a:t>
+              <a:t>11/3/2024</a:t>
             </a:fld>
             <a:endParaRPr lang="en-US"/>
           </a:p>
@@ -7780,7 +7786,7 @@
           <a:p>
             <a:fld id="{C139B7E4-65CE-45E0-B612-BB2CFA1ABD80}" type="datetimeFigureOut">
               <a:rPr lang="en-US" smtClean="0"/>
-              <a:t>11/1/2024</a:t>
+              <a:t>11/3/2024</a:t>
             </a:fld>
             <a:endParaRPr lang="en-US"/>
           </a:p>
@@ -8002,7 +8008,7 @@
           <a:p>
             <a:fld id="{C139B7E4-65CE-45E0-B612-BB2CFA1ABD80}" type="datetimeFigureOut">
               <a:rPr lang="en-US" smtClean="0"/>
-              <a:t>11/1/2024</a:t>
+              <a:t>11/3/2024</a:t>
             </a:fld>
             <a:endParaRPr lang="en-US"/>
           </a:p>
@@ -8290,7 +8296,7 @@
           <a:p>
             <a:fld id="{C139B7E4-65CE-45E0-B612-BB2CFA1ABD80}" type="datetimeFigureOut">
               <a:rPr lang="en-US" smtClean="0"/>
-              <a:t>11/1/2024</a:t>
+              <a:t>11/3/2024</a:t>
             </a:fld>
             <a:endParaRPr lang="en-US"/>
           </a:p>
@@ -10078,7 +10084,7 @@
           <a:p>
             <a:fld id="{C139B7E4-65CE-45E0-B612-BB2CFA1ABD80}" type="datetimeFigureOut">
               <a:rPr lang="en-US" smtClean="0"/>
-              <a:t>11/1/2024</a:t>
+              <a:t>11/3/2024</a:t>
             </a:fld>
             <a:endParaRPr lang="en-US"/>
           </a:p>
@@ -12142,7 +12148,7 @@
           <a:p>
             <a:fld id="{C139B7E4-65CE-45E0-B612-BB2CFA1ABD80}" type="datetimeFigureOut">
               <a:rPr lang="en-US" smtClean="0"/>
-              <a:t>11/1/2024</a:t>
+              <a:t>11/3/2024</a:t>
             </a:fld>
             <a:endParaRPr lang="en-US"/>
           </a:p>
@@ -13240,7 +13246,7 @@
           <a:p>
             <a:fld id="{C139B7E4-65CE-45E0-B612-BB2CFA1ABD80}" type="datetimeFigureOut">
               <a:rPr lang="en-US" smtClean="0"/>
-              <a:t>11/1/2024</a:t>
+              <a:t>11/3/2024</a:t>
             </a:fld>
             <a:endParaRPr lang="en-US"/>
           </a:p>
@@ -14347,7 +14353,7 @@
           <a:p>
             <a:fld id="{C139B7E4-65CE-45E0-B612-BB2CFA1ABD80}" type="datetimeFigureOut">
               <a:rPr lang="en-US" smtClean="0"/>
-              <a:t>11/1/2024</a:t>
+              <a:t>11/3/2024</a:t>
             </a:fld>
             <a:endParaRPr lang="en-US"/>
           </a:p>
@@ -15945,7 +15951,7 @@
           <a:p>
             <a:fld id="{C139B7E4-65CE-45E0-B612-BB2CFA1ABD80}" type="datetimeFigureOut">
               <a:rPr lang="en-US" smtClean="0"/>
-              <a:t>11/1/2024</a:t>
+              <a:t>11/3/2024</a:t>
             </a:fld>
             <a:endParaRPr lang="en-US"/>
           </a:p>
@@ -16455,7 +16461,7 @@
           <a:p>
             <a:fld id="{C139B7E4-65CE-45E0-B612-BB2CFA1ABD80}" type="datetimeFigureOut">
               <a:rPr lang="en-US" smtClean="0"/>
-              <a:t>11/1/2024</a:t>
+              <a:t>11/3/2024</a:t>
             </a:fld>
             <a:endParaRPr lang="en-US"/>
           </a:p>
@@ -17052,7 +17058,7 @@
           <a:p>
             <a:fld id="{C139B7E4-65CE-45E0-B612-BB2CFA1ABD80}" type="datetimeFigureOut">
               <a:rPr lang="en-US" smtClean="0"/>
-              <a:t>11/1/2024</a:t>
+              <a:t>11/3/2024</a:t>
             </a:fld>
             <a:endParaRPr lang="en-US"/>
           </a:p>
@@ -17775,7 +17781,7 @@
           <a:p>
             <a:fld id="{C139B7E4-65CE-45E0-B612-BB2CFA1ABD80}" type="datetimeFigureOut">
               <a:rPr lang="en-US" smtClean="0"/>
-              <a:t>11/1/2024</a:t>
+              <a:t>11/3/2024</a:t>
             </a:fld>
             <a:endParaRPr lang="en-US"/>
           </a:p>
@@ -18381,7 +18387,7 @@
           <a:p>
             <a:fld id="{C139B7E4-65CE-45E0-B612-BB2CFA1ABD80}" type="datetimeFigureOut">
               <a:rPr lang="en-US" smtClean="0"/>
-              <a:t>11/1/2024</a:t>
+              <a:t>11/3/2024</a:t>
             </a:fld>
             <a:endParaRPr lang="en-US"/>
           </a:p>
@@ -19028,7 +19034,7 @@
           <a:p>
             <a:fld id="{C139B7E4-65CE-45E0-B612-BB2CFA1ABD80}" type="datetimeFigureOut">
               <a:rPr lang="en-US" smtClean="0"/>
-              <a:t>11/1/2024</a:t>
+              <a:t>11/3/2024</a:t>
             </a:fld>
             <a:endParaRPr lang="en-US"/>
           </a:p>
@@ -20600,7 +20606,7 @@
           <a:p>
             <a:fld id="{C139B7E4-65CE-45E0-B612-BB2CFA1ABD80}" type="datetimeFigureOut">
               <a:rPr lang="en-US" smtClean="0"/>
-              <a:t>11/1/2024</a:t>
+              <a:t>11/3/2024</a:t>
             </a:fld>
             <a:endParaRPr lang="en-US"/>
           </a:p>
@@ -22227,7 +22233,7 @@
           <a:p>
             <a:fld id="{C139B7E4-65CE-45E0-B612-BB2CFA1ABD80}" type="datetimeFigureOut">
               <a:rPr lang="en-US" smtClean="0"/>
-              <a:t>11/1/2024</a:t>
+              <a:t>11/3/2024</a:t>
             </a:fld>
             <a:endParaRPr lang="en-US"/>
           </a:p>
@@ -23318,7 +23324,7 @@
           <a:p>
             <a:fld id="{C139B7E4-65CE-45E0-B612-BB2CFA1ABD80}" type="datetimeFigureOut">
               <a:rPr lang="en-US" smtClean="0"/>
-              <a:t>11/1/2024</a:t>
+              <a:t>11/3/2024</a:t>
             </a:fld>
             <a:endParaRPr lang="en-US"/>
           </a:p>
@@ -24439,7 +24445,7 @@
           <a:p>
             <a:fld id="{C139B7E4-65CE-45E0-B612-BB2CFA1ABD80}" type="datetimeFigureOut">
               <a:rPr lang="en-US" smtClean="0"/>
-              <a:t>11/1/2024</a:t>
+              <a:t>11/3/2024</a:t>
             </a:fld>
             <a:endParaRPr lang="en-US"/>
           </a:p>
@@ -32403,7 +32409,7 @@
           <a:p>
             <a:fld id="{C139B7E4-65CE-45E0-B612-BB2CFA1ABD80}" type="datetimeFigureOut">
               <a:rPr lang="en-US" smtClean="0"/>
-              <a:t>11/1/2024</a:t>
+              <a:t>11/3/2024</a:t>
             </a:fld>
             <a:endParaRPr lang="en-US"/>
           </a:p>
@@ -32603,7 +32609,7 @@
           <a:p>
             <a:fld id="{C139B7E4-65CE-45E0-B612-BB2CFA1ABD80}" type="datetimeFigureOut">
               <a:rPr lang="en-US" smtClean="0"/>
-              <a:t>11/1/2024</a:t>
+              <a:t>11/3/2024</a:t>
             </a:fld>
             <a:endParaRPr lang="en-US"/>
           </a:p>
@@ -33018,7 +33024,7 @@
           <a:p>
             <a:fld id="{C139B7E4-65CE-45E0-B612-BB2CFA1ABD80}" type="datetimeFigureOut">
               <a:rPr lang="en-US" smtClean="0"/>
-              <a:t>11/1/2024</a:t>
+              <a:t>11/3/2024</a:t>
             </a:fld>
             <a:endParaRPr lang="en-US"/>
           </a:p>
@@ -33194,7 +33200,7 @@
           <a:p>
             <a:fld id="{C139B7E4-65CE-45E0-B612-BB2CFA1ABD80}" type="datetimeFigureOut">
               <a:rPr lang="en-US" smtClean="0"/>
-              <a:t>11/1/2024</a:t>
+              <a:t>11/3/2024</a:t>
             </a:fld>
             <a:endParaRPr lang="en-US"/>
           </a:p>
@@ -34066,7 +34072,7 @@
           <a:p>
             <a:fld id="{C139B7E4-65CE-45E0-B612-BB2CFA1ABD80}" type="datetimeFigureOut">
               <a:rPr lang="en-US" smtClean="0"/>
-              <a:t>11/1/2024</a:t>
+              <a:t>11/3/2024</a:t>
             </a:fld>
             <a:endParaRPr lang="en-US"/>
           </a:p>
@@ -35171,7 +35177,7 @@
           <a:p>
             <a:fld id="{C139B7E4-65CE-45E0-B612-BB2CFA1ABD80}" type="datetimeFigureOut">
               <a:rPr lang="en-US" smtClean="0"/>
-              <a:t>11/1/2024</a:t>
+              <a:t>11/3/2024</a:t>
             </a:fld>
             <a:endParaRPr lang="en-US"/>
           </a:p>
@@ -36509,7 +36515,7 @@
           <a:p>
             <a:fld id="{C139B7E4-65CE-45E0-B612-BB2CFA1ABD80}" type="datetimeFigureOut">
               <a:rPr lang="en-US" smtClean="0"/>
-              <a:t>11/1/2024</a:t>
+              <a:t>11/3/2024</a:t>
             </a:fld>
             <a:endParaRPr lang="en-US"/>
           </a:p>
@@ -38080,7 +38086,7 @@
           <a:p>
             <a:fld id="{C139B7E4-65CE-45E0-B612-BB2CFA1ABD80}" type="datetimeFigureOut">
               <a:rPr lang="en-US" smtClean="0"/>
-              <a:t>11/1/2024</a:t>
+              <a:t>11/3/2024</a:t>
             </a:fld>
             <a:endParaRPr lang="en-US"/>
           </a:p>
@@ -39213,7 +39219,7 @@
           <a:p>
             <a:fld id="{C139B7E4-65CE-45E0-B612-BB2CFA1ABD80}" type="datetimeFigureOut">
               <a:rPr lang="en-US" smtClean="0"/>
-              <a:t>11/1/2024</a:t>
+              <a:t>11/3/2024</a:t>
             </a:fld>
             <a:endParaRPr lang="en-US"/>
           </a:p>
@@ -40101,7 +40107,7 @@
         <p:spPr>
           <a:xfrm>
             <a:off x="423863" y="3086100"/>
-            <a:ext cx="7704137" cy="369332"/>
+            <a:ext cx="7704137" cy="400110"/>
           </a:xfrm>
           <a:prstGeom prst="rect">
             <a:avLst/>
@@ -40115,47 +40121,14 @@
           <a:lstStyle/>
           <a:p>
             <a:r>
-              <a:rPr lang="fr-FR" dirty="0" err="1">
+              <a:rPr lang="en-US" sz="2000" b="1">
                 <a:solidFill>
                   <a:schemeClr val="bg1"/>
                 </a:solidFill>
                 <a:latin typeface="+mj-lt"/>
               </a:rPr>
-              <a:t>Capacity-Aligned</a:t>
-            </a:r>
-            <a:r>
-              <a:rPr lang="fr-FR" dirty="0">
-                <a:solidFill>
-                  <a:schemeClr val="bg1"/>
-                </a:solidFill>
-                <a:latin typeface="+mj-lt"/>
-              </a:rPr>
-              <a:t> Stable </a:t>
-            </a:r>
-            <a:r>
-              <a:rPr lang="fr-FR" dirty="0" err="1">
-                <a:solidFill>
-                  <a:schemeClr val="bg1"/>
-                </a:solidFill>
-                <a:latin typeface="+mj-lt"/>
-              </a:rPr>
-              <a:t>Teaching</a:t>
-            </a:r>
-            <a:r>
-              <a:rPr lang="fr-FR" dirty="0">
-                <a:solidFill>
-                  <a:schemeClr val="bg1"/>
-                </a:solidFill>
-                <a:latin typeface="+mj-lt"/>
-              </a:rPr>
-              <a:t> Location Engine </a:t>
-            </a:r>
-            <a:endParaRPr lang="en-US" dirty="0">
-              <a:solidFill>
-                <a:schemeClr val="bg1"/>
-              </a:solidFill>
-              <a:latin typeface="+mj-lt"/>
-            </a:endParaRPr>
+              <a:t>Capacity-Aligned Stable Teaching Location Engine </a:t>
+            </a:r>
           </a:p>
         </p:txBody>
       </p:sp>
@@ -40213,18 +40186,18 @@
           <a:lstStyle/>
           <a:p>
             <a:r>
-              <a:rPr lang="fr-FR" sz="3200" dirty="0" err="1">
+              <a:rPr lang="fr-FR" sz="3600" dirty="0" err="1">
                 <a:latin typeface="Candara" panose="020E0502030303020204" pitchFamily="34" charset="0"/>
               </a:rPr>
               <a:t>Current</a:t>
             </a:r>
             <a:r>
-              <a:rPr lang="fr-FR" sz="3200" dirty="0">
+              <a:rPr lang="fr-FR" sz="3600" dirty="0">
                 <a:latin typeface="Candara" panose="020E0502030303020204" pitchFamily="34" charset="0"/>
               </a:rPr>
-              <a:t> Room Allocation System</a:t>
-            </a:r>
-            <a:endParaRPr lang="en-US" sz="3200" dirty="0">
+              <a:t> Room Allocation System at X</a:t>
+            </a:r>
+            <a:endParaRPr lang="en-US" sz="3600" dirty="0">
               <a:latin typeface="Candara" panose="020E0502030303020204" pitchFamily="34" charset="0"/>
             </a:endParaRPr>
           </a:p>
@@ -40248,7 +40221,7 @@
         </p:nvSpPr>
         <p:spPr>
           <a:xfrm>
-            <a:off x="838200" y="1825625"/>
+            <a:off x="838200" y="1693862"/>
             <a:ext cx="10515600" cy="3470275"/>
           </a:xfrm>
         </p:spPr>
@@ -40370,7 +40343,7 @@
         <p:spPr>
           <a:xfrm>
             <a:off x="838200" y="5295900"/>
-            <a:ext cx="10515600" cy="523220"/>
+            <a:ext cx="10515600" cy="954107"/>
           </a:xfrm>
           <a:prstGeom prst="rect">
             <a:avLst/>
@@ -40385,60 +40358,138 @@
           <a:p>
             <a:pPr algn="ctr"/>
             <a:r>
-              <a:rPr lang="fr-FR" sz="2800" dirty="0">
+              <a:rPr lang="fr-FR" sz="2800" b="1" dirty="0">
                 <a:latin typeface="Candara" panose="020E0502030303020204" pitchFamily="34" charset="0"/>
               </a:rPr>
               <a:t>An ineffective system </a:t>
             </a:r>
             <a:r>
-              <a:rPr lang="fr-FR" sz="2800" dirty="0" err="1">
+              <a:rPr lang="fr-FR" sz="2800" b="1" dirty="0" err="1">
                 <a:latin typeface="Candara" panose="020E0502030303020204" pitchFamily="34" charset="0"/>
               </a:rPr>
               <a:t>that</a:t>
             </a:r>
             <a:r>
-              <a:rPr lang="fr-FR" sz="2800" dirty="0">
+              <a:rPr lang="fr-FR" sz="2800" b="1" dirty="0">
                 <a:latin typeface="Candara" panose="020E0502030303020204" pitchFamily="34" charset="0"/>
               </a:rPr>
               <a:t> </a:t>
             </a:r>
             <a:r>
-              <a:rPr lang="fr-FR" sz="2800" dirty="0" err="1">
+              <a:rPr lang="fr-FR" sz="2800" b="1" dirty="0" err="1">
                 <a:latin typeface="Candara" panose="020E0502030303020204" pitchFamily="34" charset="0"/>
               </a:rPr>
               <a:t>doesn’t</a:t>
             </a:r>
             <a:r>
-              <a:rPr lang="fr-FR" sz="2800" dirty="0">
+              <a:rPr lang="fr-FR" sz="2800" b="1" dirty="0">
                 <a:latin typeface="Candara" panose="020E0502030303020204" pitchFamily="34" charset="0"/>
               </a:rPr>
               <a:t> </a:t>
             </a:r>
             <a:r>
-              <a:rPr lang="fr-FR" sz="2800" dirty="0" err="1">
+              <a:rPr lang="fr-FR" sz="2800" b="1" dirty="0" err="1">
                 <a:latin typeface="Candara" panose="020E0502030303020204" pitchFamily="34" charset="0"/>
               </a:rPr>
               <a:t>allow</a:t>
             </a:r>
             <a:r>
-              <a:rPr lang="fr-FR" sz="2800" dirty="0">
+              <a:rPr lang="fr-FR" sz="2800" b="1" dirty="0">
                 <a:latin typeface="Candara" panose="020E0502030303020204" pitchFamily="34" charset="0"/>
               </a:rPr>
-              <a:t> Stakeholders to </a:t>
-            </a:r>
-            <a:r>
-              <a:rPr lang="fr-FR" sz="2800" dirty="0" err="1">
+              <a:t> stakeholders to </a:t>
+            </a:r>
+            <a:r>
+              <a:rPr lang="fr-FR" sz="2800" b="1" dirty="0" err="1">
                 <a:latin typeface="Candara" panose="020E0502030303020204" pitchFamily="34" charset="0"/>
               </a:rPr>
               <a:t>participate</a:t>
             </a:r>
-            <a:r>
-              <a:rPr lang="fr-FR" sz="2800" dirty="0">
+            <a:endParaRPr lang="fr-FR" sz="2800" b="1" dirty="0">
+              <a:latin typeface="Candara" panose="020E0502030303020204" pitchFamily="34" charset="0"/>
+            </a:endParaRPr>
+          </a:p>
+          <a:p>
+            <a:pPr algn="ctr"/>
+            <a:r>
+              <a:rPr lang="fr-FR" sz="2800" b="1" dirty="0">
+                <a:latin typeface="Candara" panose="020E0502030303020204" pitchFamily="34" charset="0"/>
+              </a:rPr>
+              <a:t>and </a:t>
+            </a:r>
+            <a:r>
+              <a:rPr lang="fr-FR" sz="2800" b="1" dirty="0" err="1">
+                <a:latin typeface="Candara" panose="020E0502030303020204" pitchFamily="34" charset="0"/>
+              </a:rPr>
+              <a:t>doesn’t</a:t>
+            </a:r>
+            <a:r>
+              <a:rPr lang="fr-FR" sz="2800" b="1" dirty="0">
+                <a:latin typeface="Candara" panose="020E0502030303020204" pitchFamily="34" charset="0"/>
+              </a:rPr>
+              <a:t> </a:t>
+            </a:r>
+            <a:r>
+              <a:rPr lang="fr-FR" sz="2800" b="1" dirty="0" err="1">
+                <a:latin typeface="Candara" panose="020E0502030303020204" pitchFamily="34" charset="0"/>
+              </a:rPr>
+              <a:t>take</a:t>
+            </a:r>
+            <a:r>
+              <a:rPr lang="fr-FR" sz="2800" b="1" dirty="0">
+                <a:latin typeface="Candara" panose="020E0502030303020204" pitchFamily="34" charset="0"/>
+              </a:rPr>
+              <a:t> </a:t>
+            </a:r>
+            <a:r>
+              <a:rPr lang="fr-FR" sz="2800" b="1" dirty="0" err="1">
+                <a:latin typeface="Candara" panose="020E0502030303020204" pitchFamily="34" charset="0"/>
+              </a:rPr>
+              <a:t>into</a:t>
+            </a:r>
+            <a:r>
+              <a:rPr lang="fr-FR" sz="2800" b="1" dirty="0">
+                <a:latin typeface="Candara" panose="020E0502030303020204" pitchFamily="34" charset="0"/>
+              </a:rPr>
+              <a:t> </a:t>
+            </a:r>
+            <a:r>
+              <a:rPr lang="fr-FR" sz="2800" b="1" dirty="0" err="1">
+                <a:latin typeface="Candara" panose="020E0502030303020204" pitchFamily="34" charset="0"/>
+              </a:rPr>
+              <a:t>account</a:t>
+            </a:r>
+            <a:r>
+              <a:rPr lang="fr-FR" sz="2800" b="1" dirty="0">
+                <a:latin typeface="Candara" panose="020E0502030303020204" pitchFamily="34" charset="0"/>
+              </a:rPr>
+              <a:t> </a:t>
+            </a:r>
+            <a:r>
+              <a:rPr lang="fr-FR" sz="2800" b="1" dirty="0" err="1">
+                <a:latin typeface="Candara" panose="020E0502030303020204" pitchFamily="34" charset="0"/>
+              </a:rPr>
+              <a:t>pedagogical</a:t>
+            </a:r>
+            <a:r>
+              <a:rPr lang="fr-FR" sz="2800" b="1" dirty="0">
+                <a:latin typeface="Candara" panose="020E0502030303020204" pitchFamily="34" charset="0"/>
+              </a:rPr>
+              <a:t> </a:t>
+            </a:r>
+            <a:r>
+              <a:rPr lang="fr-FR" sz="2800" b="1" dirty="0" err="1">
+                <a:latin typeface="Candara" panose="020E0502030303020204" pitchFamily="34" charset="0"/>
+              </a:rPr>
+              <a:t>needs</a:t>
+            </a:r>
+            <a:r>
+              <a:rPr lang="fr-FR" sz="2800" b="1" dirty="0">
                 <a:latin typeface="Candara" panose="020E0502030303020204" pitchFamily="34" charset="0"/>
               </a:rPr>
               <a:t>  </a:t>
             </a:r>
-            <a:endParaRPr lang="en-US" sz="2800" dirty="0">
+            <a:endParaRPr lang="en-US" sz="2800" b="1" dirty="0">
               <a:latin typeface="Candara" panose="020E0502030303020204" pitchFamily="34" charset="0"/>
             </a:endParaRPr>
           </a:p>
@@ -40462,7 +40513,13 @@
   <p:cSld>
     <p:spTree>
       <p:nvGrpSpPr>
-        <p:cNvPr id="1" name=""/>
+        <p:cNvPr id="1" name="">
+          <a:extLst>
+            <a:ext uri="{FF2B5EF4-FFF2-40B4-BE49-F238E27FC236}">
+              <a16:creationId xmlns:a16="http://schemas.microsoft.com/office/drawing/2014/main" id="{1B672E12-22EE-02AF-5A66-141EE360587D}"/>
+            </a:ext>
+          </a:extLst>
+        </p:cNvPr>
         <p:cNvGrpSpPr/>
         <p:nvPr/>
       </p:nvGrpSpPr>
@@ -40479,7 +40536,7 @@
           <p:cNvPr id="2" name="Title 1">
             <a:extLst>
               <a:ext uri="{FF2B5EF4-FFF2-40B4-BE49-F238E27FC236}">
-                <a16:creationId xmlns:a16="http://schemas.microsoft.com/office/drawing/2014/main" id="{F253036A-D263-8089-3616-A9B78162423E}"/>
+                <a16:creationId xmlns:a16="http://schemas.microsoft.com/office/drawing/2014/main" id="{1656F470-D29B-DB9B-CA26-32BA21BF0061}"/>
               </a:ext>
             </a:extLst>
           </p:cNvPr>
@@ -40498,28 +40555,40 @@
           <a:lstStyle/>
           <a:p>
             <a:r>
+              <a:rPr lang="fr-FR" sz="3600" dirty="0">
+                <a:latin typeface="Candara" panose="020E0502030303020204" pitchFamily="34" charset="0"/>
+              </a:rPr>
+              <a:t>Global </a:t>
+            </a:r>
+            <a:r>
               <a:rPr lang="fr-FR" sz="3600" dirty="0" err="1">
                 <a:latin typeface="Candara" panose="020E0502030303020204" pitchFamily="34" charset="0"/>
               </a:rPr>
-              <a:t>What</a:t>
+              <a:t>Market</a:t>
             </a:r>
             <a:r>
               <a:rPr lang="fr-FR" sz="3600" dirty="0">
                 <a:latin typeface="Candara" panose="020E0502030303020204" pitchFamily="34" charset="0"/>
               </a:rPr>
-              <a:t> are </a:t>
+              <a:t> Impact and </a:t>
             </a:r>
             <a:r>
               <a:rPr lang="fr-FR" sz="3600" dirty="0" err="1">
                 <a:latin typeface="Candara" panose="020E0502030303020204" pitchFamily="34" charset="0"/>
               </a:rPr>
-              <a:t>CASTLE’s</a:t>
+              <a:t>Existing</a:t>
             </a:r>
             <a:r>
               <a:rPr lang="fr-FR" sz="3600" dirty="0">
                 <a:latin typeface="Candara" panose="020E0502030303020204" pitchFamily="34" charset="0"/>
               </a:rPr>
-              <a:t> goals ? </a:t>
+              <a:t> </a:t>
+            </a:r>
+            <a:r>
+              <a:rPr lang="fr-FR" sz="3600" dirty="0" err="1">
+                <a:latin typeface="Candara" panose="020E0502030303020204" pitchFamily="34" charset="0"/>
+              </a:rPr>
+              <a:t>systems</a:t>
             </a:r>
             <a:endParaRPr lang="en-US" sz="3600" dirty="0">
               <a:latin typeface="Candara" panose="020E0502030303020204" pitchFamily="34" charset="0"/>
@@ -40529,10 +40598,10 @@
       </p:sp>
       <p:sp>
         <p:nvSpPr>
-          <p:cNvPr id="9" name="Text Placeholder 8">
-            <a:extLst>
-              <a:ext uri="{FF2B5EF4-FFF2-40B4-BE49-F238E27FC236}">
-                <a16:creationId xmlns:a16="http://schemas.microsoft.com/office/drawing/2014/main" id="{9522DEF8-9AD8-3DE1-B9EB-9A85FAE9AEAD}"/>
+          <p:cNvPr id="3" name="Content Placeholder 2">
+            <a:extLst>
+              <a:ext uri="{FF2B5EF4-FFF2-40B4-BE49-F238E27FC236}">
+                <a16:creationId xmlns:a16="http://schemas.microsoft.com/office/drawing/2014/main" id="{5E55E643-8EBE-0805-5B59-015C8DC6665B}"/>
               </a:ext>
             </a:extLst>
           </p:cNvPr>
@@ -40540,45 +40609,19 @@
             <a:spLocks noGrp="1"/>
           </p:cNvSpPr>
           <p:nvPr>
-            <p:ph type="body" idx="1"/>
+            <p:ph idx="1"/>
           </p:nvPr>
         </p:nvSpPr>
-        <p:spPr/>
-        <p:txBody>
-          <a:bodyPr/>
-          <a:lstStyle/>
-          <a:p>
-            <a:r>
-              <a:rPr lang="fr-FR" b="0" u="sng" dirty="0">
-                <a:latin typeface="Candara" panose="020E0502030303020204" pitchFamily="34" charset="0"/>
-              </a:rPr>
-              <a:t>Professor Input</a:t>
-            </a:r>
-            <a:endParaRPr lang="en-US" b="0" u="sng" dirty="0">
-              <a:latin typeface="Candara" panose="020E0502030303020204" pitchFamily="34" charset="0"/>
-            </a:endParaRPr>
-          </a:p>
-        </p:txBody>
-      </p:sp>
-      <p:sp>
-        <p:nvSpPr>
-          <p:cNvPr id="3" name="Content Placeholder 2">
-            <a:extLst>
-              <a:ext uri="{FF2B5EF4-FFF2-40B4-BE49-F238E27FC236}">
-                <a16:creationId xmlns:a16="http://schemas.microsoft.com/office/drawing/2014/main" id="{722E4B27-BFAD-9D17-B41D-FE18298D3DA4}"/>
-              </a:ext>
-            </a:extLst>
-          </p:cNvPr>
-          <p:cNvSpPr>
-            <a:spLocks noGrp="1"/>
-          </p:cNvSpPr>
-          <p:nvPr>
-            <p:ph sz="half" idx="2"/>
-          </p:nvPr>
-        </p:nvSpPr>
-        <p:spPr/>
-        <p:txBody>
-          <a:bodyPr anchor="t"/>
+        <p:spPr>
+          <a:xfrm>
+            <a:off x="838200" y="1693862"/>
+            <a:ext cx="10515600" cy="3470275"/>
+          </a:xfrm>
+        </p:spPr>
+        <p:txBody>
+          <a:bodyPr anchor="ctr">
+            <a:normAutofit/>
+          </a:bodyPr>
           <a:lstStyle/>
           <a:p>
             <a:pPr marL="342900" indent="-342900">
@@ -40586,46 +40629,52 @@
               <a:buChar char="•"/>
             </a:pPr>
             <a:r>
-              <a:rPr lang="fr-FR" sz="2400" dirty="0">
+              <a:rPr lang="fr-FR" b="1" dirty="0" err="1">
                 <a:latin typeface="Candara" panose="020E0502030303020204" pitchFamily="34" charset="0"/>
               </a:rPr>
-              <a:t>Prof can </a:t>
-            </a:r>
-            <a:r>
-              <a:rPr lang="fr-FR" sz="2400" b="1" dirty="0">
+              <a:t>Globally</a:t>
+            </a:r>
+            <a:r>
+              <a:rPr lang="fr-FR" dirty="0">
                 <a:latin typeface="Candara" panose="020E0502030303020204" pitchFamily="34" charset="0"/>
               </a:rPr>
-              <a:t>have a </a:t>
-            </a:r>
-            <a:r>
-              <a:rPr lang="fr-FR" sz="2400" b="1" dirty="0" err="1">
+              <a:t> : </a:t>
+            </a:r>
+            <a:r>
+              <a:rPr lang="fr-FR" dirty="0" err="1">
                 <a:latin typeface="Candara" panose="020E0502030303020204" pitchFamily="34" charset="0"/>
               </a:rPr>
-              <a:t>say</a:t>
-            </a:r>
-            <a:r>
-              <a:rPr lang="fr-FR" sz="2400" b="1" dirty="0">
+              <a:t>Universities</a:t>
+            </a:r>
+            <a:r>
+              <a:rPr lang="fr-FR" dirty="0">
+                <a:latin typeface="Candara" panose="020E0502030303020204" pitchFamily="34" charset="0"/>
+              </a:rPr>
+              <a:t> ~18500  </a:t>
+            </a:r>
+            <a:r>
+              <a:rPr lang="fr-FR" dirty="0" err="1">
+                <a:latin typeface="Candara" panose="020E0502030303020204" pitchFamily="34" charset="0"/>
+              </a:rPr>
+              <a:t>worldwide</a:t>
+            </a:r>
+            <a:r>
+              <a:rPr lang="fr-FR" dirty="0">
+                <a:latin typeface="Candara" panose="020E0502030303020204" pitchFamily="34" charset="0"/>
+              </a:rPr>
+              <a:t>, ~250m </a:t>
+            </a:r>
+            <a:r>
+              <a:rPr lang="fr-FR" dirty="0" err="1">
+                <a:latin typeface="Candara" panose="020E0502030303020204" pitchFamily="34" charset="0"/>
+              </a:rPr>
+              <a:t>students</a:t>
+            </a:r>
+            <a:r>
+              <a:rPr lang="fr-FR" dirty="0">
                 <a:latin typeface="Candara" panose="020E0502030303020204" pitchFamily="34" charset="0"/>
               </a:rPr>
               <a:t> </a:t>
-            </a:r>
-            <a:r>
-              <a:rPr lang="fr-FR" sz="2400" dirty="0">
-                <a:latin typeface="Candara" panose="020E0502030303020204" pitchFamily="34" charset="0"/>
-              </a:rPr>
-              <a:t>in the </a:t>
-            </a:r>
-            <a:r>
-              <a:rPr lang="fr-FR" sz="2400" dirty="0" err="1">
-                <a:latin typeface="Candara" panose="020E0502030303020204" pitchFamily="34" charset="0"/>
-              </a:rPr>
-              <a:t>classroom</a:t>
-            </a:r>
-            <a:r>
-              <a:rPr lang="fr-FR" sz="2400" dirty="0">
-                <a:latin typeface="Candara" panose="020E0502030303020204" pitchFamily="34" charset="0"/>
-              </a:rPr>
-              <a:t> allocation</a:t>
             </a:r>
           </a:p>
           <a:p>
@@ -40634,164 +40683,26 @@
               <a:buChar char="•"/>
             </a:pPr>
             <a:r>
-              <a:rPr lang="fr-FR" sz="2400" b="1" dirty="0" err="1">
+              <a:rPr lang="en-GB" b="1" dirty="0">
                 <a:latin typeface="Candara" panose="020E0502030303020204" pitchFamily="34" charset="0"/>
               </a:rPr>
-              <a:t>Prioritize</a:t>
-            </a:r>
-            <a:r>
-              <a:rPr lang="fr-FR" sz="2400" dirty="0">
+              <a:t>Target</a:t>
+            </a:r>
+            <a:r>
+              <a:rPr lang="en-GB" dirty="0">
                 <a:latin typeface="Candara" panose="020E0502030303020204" pitchFamily="34" charset="0"/>
               </a:rPr>
-              <a:t> and </a:t>
-            </a:r>
-            <a:r>
-              <a:rPr lang="fr-FR" sz="2400" b="1" dirty="0">
-                <a:latin typeface="Candara" panose="020E0502030303020204" pitchFamily="34" charset="0"/>
-              </a:rPr>
-              <a:t>signal</a:t>
-            </a:r>
-            <a:r>
-              <a:rPr lang="fr-FR" sz="2400" dirty="0">
-                <a:latin typeface="Candara" panose="020E0502030303020204" pitchFamily="34" charset="0"/>
-              </a:rPr>
-              <a:t> </a:t>
-            </a:r>
-            <a:r>
-              <a:rPr lang="fr-FR" sz="2400" dirty="0" err="1">
-                <a:latin typeface="Candara" panose="020E0502030303020204" pitchFamily="34" charset="0"/>
-              </a:rPr>
-              <a:t>their</a:t>
-            </a:r>
-            <a:r>
-              <a:rPr lang="fr-FR" sz="2400" dirty="0">
-                <a:latin typeface="Candara" panose="020E0502030303020204" pitchFamily="34" charset="0"/>
-              </a:rPr>
-              <a:t> room </a:t>
-            </a:r>
-            <a:r>
-              <a:rPr lang="fr-FR" sz="2400" dirty="0" err="1">
-                <a:latin typeface="Candara" panose="020E0502030303020204" pitchFamily="34" charset="0"/>
-              </a:rPr>
-              <a:t>preferences</a:t>
-            </a:r>
-            <a:endParaRPr lang="fr-FR" sz="2400" dirty="0">
-              <a:latin typeface="Candara" panose="020E0502030303020204" pitchFamily="34" charset="0"/>
-            </a:endParaRPr>
-          </a:p>
-          <a:p>
-            <a:endParaRPr lang="fr-FR" dirty="0">
-              <a:latin typeface="Candara" panose="020E0502030303020204" pitchFamily="34" charset="0"/>
-            </a:endParaRPr>
-          </a:p>
-        </p:txBody>
-      </p:sp>
-      <p:sp>
-        <p:nvSpPr>
-          <p:cNvPr id="10" name="Text Placeholder 9">
-            <a:extLst>
-              <a:ext uri="{FF2B5EF4-FFF2-40B4-BE49-F238E27FC236}">
-                <a16:creationId xmlns:a16="http://schemas.microsoft.com/office/drawing/2014/main" id="{5AC2D7C7-B573-DCA6-DFD1-00A062EB6C12}"/>
-              </a:ext>
-            </a:extLst>
-          </p:cNvPr>
-          <p:cNvSpPr>
-            <a:spLocks noGrp="1"/>
-          </p:cNvSpPr>
-          <p:nvPr>
-            <p:ph type="body" sz="quarter" idx="3"/>
-          </p:nvPr>
-        </p:nvSpPr>
-        <p:spPr/>
-        <p:txBody>
-          <a:bodyPr/>
-          <a:lstStyle/>
-          <a:p>
-            <a:r>
-              <a:rPr lang="fr-FR" b="0" u="sng" dirty="0">
-                <a:latin typeface="Candara" panose="020E0502030303020204" pitchFamily="34" charset="0"/>
-              </a:rPr>
-              <a:t>Administration </a:t>
-            </a:r>
-            <a:r>
-              <a:rPr lang="fr-FR" b="0" u="sng" dirty="0" err="1">
-                <a:latin typeface="Candara" panose="020E0502030303020204" pitchFamily="34" charset="0"/>
-              </a:rPr>
-              <a:t>Side</a:t>
-            </a:r>
-            <a:endParaRPr lang="en-US" b="0" u="sng" dirty="0">
-              <a:latin typeface="Candara" panose="020E0502030303020204" pitchFamily="34" charset="0"/>
-            </a:endParaRPr>
-          </a:p>
-        </p:txBody>
-      </p:sp>
-      <p:sp>
-        <p:nvSpPr>
-          <p:cNvPr id="8" name="Content Placeholder 7">
-            <a:extLst>
-              <a:ext uri="{FF2B5EF4-FFF2-40B4-BE49-F238E27FC236}">
-                <a16:creationId xmlns:a16="http://schemas.microsoft.com/office/drawing/2014/main" id="{E778B19C-75FD-CB78-A4BF-5DF8EBC72D6B}"/>
-              </a:ext>
-            </a:extLst>
-          </p:cNvPr>
-          <p:cNvSpPr>
-            <a:spLocks noGrp="1"/>
-          </p:cNvSpPr>
-          <p:nvPr>
-            <p:ph sz="quarter" idx="4"/>
-          </p:nvPr>
-        </p:nvSpPr>
-        <p:spPr/>
-        <p:txBody>
-          <a:bodyPr anchor="t"/>
-          <a:lstStyle/>
+              <a:t>: Top universities in developed markets : 80 Unis, 2m students</a:t>
+            </a:r>
+          </a:p>
           <a:p>
             <a:pPr marL="342900" indent="-342900">
               <a:buFont typeface="Arial" panose="020B0604020202020204" pitchFamily="34" charset="0"/>
               <a:buChar char="•"/>
             </a:pPr>
-            <a:r>
-              <a:rPr lang="fr-FR" sz="2400" b="1" dirty="0" err="1">
-                <a:latin typeface="Candara" panose="020E0502030303020204" pitchFamily="34" charset="0"/>
-              </a:rPr>
-              <a:t>Ease</a:t>
-            </a:r>
-            <a:r>
-              <a:rPr lang="fr-FR" sz="2400" b="1" dirty="0">
-                <a:latin typeface="Candara" panose="020E0502030303020204" pitchFamily="34" charset="0"/>
-              </a:rPr>
-              <a:t> the </a:t>
-            </a:r>
-            <a:r>
-              <a:rPr lang="fr-FR" sz="2400" b="1" dirty="0" err="1">
-                <a:latin typeface="Candara" panose="020E0502030303020204" pitchFamily="34" charset="0"/>
-              </a:rPr>
-              <a:t>load</a:t>
-            </a:r>
-            <a:r>
-              <a:rPr lang="fr-FR" sz="2400" b="1" dirty="0">
-                <a:latin typeface="Candara" panose="020E0502030303020204" pitchFamily="34" charset="0"/>
-              </a:rPr>
-              <a:t> </a:t>
-            </a:r>
-            <a:r>
-              <a:rPr lang="fr-FR" sz="2400" dirty="0">
-                <a:latin typeface="Candara" panose="020E0502030303020204" pitchFamily="34" charset="0"/>
-              </a:rPr>
-              <a:t>on the </a:t>
-            </a:r>
-            <a:r>
-              <a:rPr lang="fr-FR" sz="2400" dirty="0" err="1">
-                <a:latin typeface="Candara" panose="020E0502030303020204" pitchFamily="34" charset="0"/>
-              </a:rPr>
-              <a:t>Registrar’s</a:t>
-            </a:r>
-            <a:r>
-              <a:rPr lang="fr-FR" sz="2400" dirty="0">
-                <a:latin typeface="Candara" panose="020E0502030303020204" pitchFamily="34" charset="0"/>
-              </a:rPr>
-              <a:t> office</a:t>
-            </a:r>
+            <a:endParaRPr lang="en-GB" b="1" dirty="0">
+              <a:latin typeface="Candara" panose="020E0502030303020204" pitchFamily="34" charset="0"/>
+            </a:endParaRPr>
           </a:p>
           <a:p>
             <a:pPr marL="342900" indent="-342900">
@@ -40799,88 +40710,50 @@
               <a:buChar char="•"/>
             </a:pPr>
             <a:r>
-              <a:rPr lang="fr-FR" sz="2400" b="1" dirty="0">
+              <a:rPr lang="en-US" dirty="0" err="1">
                 <a:latin typeface="Candara" panose="020E0502030303020204" pitchFamily="34" charset="0"/>
               </a:rPr>
-              <a:t>Efficient</a:t>
-            </a:r>
-            <a:r>
-              <a:rPr lang="fr-FR" sz="2400" dirty="0">
+              <a:t>Clearhouses</a:t>
+            </a:r>
+            <a:r>
+              <a:rPr lang="en-US" dirty="0">
                 <a:latin typeface="Candara" panose="020E0502030303020204" pitchFamily="34" charset="0"/>
               </a:rPr>
-              <a:t> allocation of the  </a:t>
-            </a:r>
-            <a:r>
-              <a:rPr lang="fr-FR" sz="2400" dirty="0" err="1">
+              <a:t> if any are </a:t>
+            </a:r>
+            <a:r>
+              <a:rPr lang="en-US" b="1" dirty="0">
                 <a:latin typeface="Candara" panose="020E0502030303020204" pitchFamily="34" charset="0"/>
               </a:rPr>
-              <a:t>school’s</a:t>
-            </a:r>
-            <a:r>
-              <a:rPr lang="fr-FR" sz="2400" dirty="0">
+              <a:t>manual</a:t>
+            </a:r>
+            <a:r>
+              <a:rPr lang="en-US" dirty="0">
                 <a:latin typeface="Candara" panose="020E0502030303020204" pitchFamily="34" charset="0"/>
               </a:rPr>
-              <a:t> ressources</a:t>
-            </a:r>
-            <a:endParaRPr lang="en-US" sz="2400" dirty="0">
-              <a:latin typeface="Candara" panose="020E0502030303020204" pitchFamily="34" charset="0"/>
-            </a:endParaRPr>
-          </a:p>
-          <a:p>
-            <a:endParaRPr lang="en-US" dirty="0"/>
-          </a:p>
-        </p:txBody>
-      </p:sp>
-      <p:sp>
-        <p:nvSpPr>
-          <p:cNvPr id="4" name="Right Brace 3">
-            <a:extLst>
-              <a:ext uri="{FF2B5EF4-FFF2-40B4-BE49-F238E27FC236}">
-                <a16:creationId xmlns:a16="http://schemas.microsoft.com/office/drawing/2014/main" id="{1A06DA47-E5A1-6231-BBB9-C334A25F376A}"/>
-              </a:ext>
-            </a:extLst>
-          </p:cNvPr>
-          <p:cNvSpPr/>
-          <p:nvPr/>
-        </p:nvSpPr>
-        <p:spPr>
-          <a:xfrm rot="5400000">
-            <a:off x="3257866" y="2557146"/>
-            <a:ext cx="315277" cy="5157786"/>
-          </a:xfrm>
-          <a:prstGeom prst="rightBrace">
-            <a:avLst/>
-          </a:prstGeom>
-        </p:spPr>
-        <p:style>
-          <a:lnRef idx="2">
-            <a:schemeClr val="accent1"/>
-          </a:lnRef>
-          <a:fillRef idx="0">
-            <a:schemeClr val="accent1"/>
-          </a:fillRef>
-          <a:effectRef idx="1">
-            <a:schemeClr val="accent1"/>
-          </a:effectRef>
-          <a:fontRef idx="minor">
-            <a:schemeClr val="tx1"/>
-          </a:fontRef>
-        </p:style>
-        <p:txBody>
-          <a:bodyPr rtlCol="0" anchor="ctr"/>
-          <a:lstStyle/>
-          <a:p>
-            <a:pPr algn="ctr"/>
-            <a:endParaRPr lang="en-US"/>
-          </a:p>
-        </p:txBody>
-      </p:sp>
-      <p:sp>
-        <p:nvSpPr>
-          <p:cNvPr id="6" name="TextBox 5">
-            <a:extLst>
-              <a:ext uri="{FF2B5EF4-FFF2-40B4-BE49-F238E27FC236}">
-                <a16:creationId xmlns:a16="http://schemas.microsoft.com/office/drawing/2014/main" id="{F6760039-53C2-EA9B-E002-DDDB105B39E9}"/>
+              <a:t> : X, CBS, INSEAD, HEC</a:t>
+            </a:r>
+          </a:p>
+          <a:p>
+            <a:pPr marL="342900" indent="-342900">
+              <a:buFont typeface="Arial" panose="020B0604020202020204" pitchFamily="34" charset="0"/>
+              <a:buChar char="•"/>
+            </a:pPr>
+            <a:r>
+              <a:rPr lang="en-US" dirty="0">
+                <a:latin typeface="Candara" panose="020E0502030303020204" pitchFamily="34" charset="0"/>
+              </a:rPr>
+              <a:t>No papers or advertising of such a system</a:t>
+            </a:r>
+          </a:p>
+        </p:txBody>
+      </p:sp>
+      <p:sp>
+        <p:nvSpPr>
+          <p:cNvPr id="4" name="TextBox 3">
+            <a:extLst>
+              <a:ext uri="{FF2B5EF4-FFF2-40B4-BE49-F238E27FC236}">
+                <a16:creationId xmlns:a16="http://schemas.microsoft.com/office/drawing/2014/main" id="{318E4D85-45E5-4BDD-3EFF-8E4BC6E41F6A}"/>
               </a:ext>
             </a:extLst>
           </p:cNvPr>
@@ -40889,8 +40762,8 @@
         </p:nvSpPr>
         <p:spPr>
           <a:xfrm>
-            <a:off x="836611" y="5405119"/>
-            <a:ext cx="10258109" cy="523220"/>
+            <a:off x="838200" y="5485080"/>
+            <a:ext cx="10515600" cy="523220"/>
           </a:xfrm>
           <a:prstGeom prst="rect">
             <a:avLst/>
@@ -40898,17 +40771,23 @@
           <a:noFill/>
         </p:spPr>
         <p:txBody>
-          <a:bodyPr wrap="square">
+          <a:bodyPr wrap="square" rtlCol="0">
             <a:spAutoFit/>
           </a:bodyPr>
           <a:lstStyle/>
           <a:p>
             <a:pPr algn="ctr"/>
             <a:r>
+              <a:rPr lang="fr-FR" sz="2800" b="1" dirty="0">
+                <a:latin typeface="Candara" panose="020E0502030303020204" pitchFamily="34" charset="0"/>
+              </a:rPr>
+              <a:t>A </a:t>
+            </a:r>
+            <a:r>
               <a:rPr lang="fr-FR" sz="2800" b="1" dirty="0" err="1">
                 <a:latin typeface="Candara" panose="020E0502030303020204" pitchFamily="34" charset="0"/>
               </a:rPr>
-              <a:t>Considers</a:t>
+              <a:t>broad</a:t>
             </a:r>
             <a:r>
               <a:rPr lang="fr-FR" sz="2800" b="1" dirty="0">
@@ -40920,113 +40799,36 @@
               <a:rPr lang="fr-FR" sz="2800" b="1" dirty="0" err="1">
                 <a:latin typeface="Candara" panose="020E0502030303020204" pitchFamily="34" charset="0"/>
               </a:rPr>
-              <a:t>Professors</a:t>
+              <a:t>reach</a:t>
             </a:r>
             <a:r>
               <a:rPr lang="fr-FR" sz="2800" b="1" dirty="0">
                 <a:latin typeface="Candara" panose="020E0502030303020204" pitchFamily="34" charset="0"/>
               </a:rPr>
-              <a:t>’ </a:t>
+              <a:t> and </a:t>
             </a:r>
             <a:r>
               <a:rPr lang="fr-FR" sz="2800" b="1" dirty="0" err="1">
                 <a:latin typeface="Candara" panose="020E0502030303020204" pitchFamily="34" charset="0"/>
               </a:rPr>
-              <a:t>preferences</a:t>
+              <a:t>potential</a:t>
             </a:r>
             <a:r>
               <a:rPr lang="fr-FR" sz="2800" b="1" dirty="0">
                 <a:latin typeface="Candara" panose="020E0502030303020204" pitchFamily="34" charset="0"/>
               </a:rPr>
-              <a:t>…</a:t>
-            </a:r>
-            <a:r>
-              <a:rPr lang="fr-FR" sz="2800" b="1" dirty="0" err="1">
-                <a:latin typeface="Candara" panose="020E0502030303020204" pitchFamily="34" charset="0"/>
-              </a:rPr>
-              <a:t>while</a:t>
-            </a:r>
-            <a:r>
-              <a:rPr lang="fr-FR" sz="2800" b="1" dirty="0">
-                <a:latin typeface="Candara" panose="020E0502030303020204" pitchFamily="34" charset="0"/>
-              </a:rPr>
-              <a:t> </a:t>
-            </a:r>
-            <a:r>
-              <a:rPr lang="fr-FR" sz="2800" b="1" dirty="0" err="1">
-                <a:latin typeface="Candara" panose="020E0502030303020204" pitchFamily="34" charset="0"/>
-              </a:rPr>
-              <a:t>being</a:t>
-            </a:r>
-            <a:r>
-              <a:rPr lang="fr-FR" sz="2800" b="1" dirty="0">
-                <a:latin typeface="Candara" panose="020E0502030303020204" pitchFamily="34" charset="0"/>
-              </a:rPr>
-              <a:t> </a:t>
-            </a:r>
-            <a:r>
-              <a:rPr lang="fr-FR" sz="2800" b="1" dirty="0" err="1">
-                <a:latin typeface="Candara" panose="020E0502030303020204" pitchFamily="34" charset="0"/>
-              </a:rPr>
-              <a:t>easier</a:t>
-            </a:r>
-            <a:r>
-              <a:rPr lang="fr-FR" sz="2800" b="1" dirty="0">
-                <a:latin typeface="Candara" panose="020E0502030303020204" pitchFamily="34" charset="0"/>
-              </a:rPr>
-              <a:t> to plan out</a:t>
-            </a:r>
-          </a:p>
-        </p:txBody>
-      </p:sp>
-      <p:sp>
-        <p:nvSpPr>
-          <p:cNvPr id="11" name="Right Brace 10">
-            <a:extLst>
-              <a:ext uri="{FF2B5EF4-FFF2-40B4-BE49-F238E27FC236}">
-                <a16:creationId xmlns:a16="http://schemas.microsoft.com/office/drawing/2014/main" id="{29DD95DA-D4CE-34D7-B056-7878F577F1D1}"/>
-              </a:ext>
-            </a:extLst>
-          </p:cNvPr>
-          <p:cNvSpPr/>
-          <p:nvPr/>
-        </p:nvSpPr>
-        <p:spPr>
-          <a:xfrm rot="5400000">
-            <a:off x="8539322" y="2557146"/>
-            <a:ext cx="315277" cy="5157786"/>
-          </a:xfrm>
-          <a:prstGeom prst="rightBrace">
-            <a:avLst/>
-          </a:prstGeom>
-        </p:spPr>
-        <p:style>
-          <a:lnRef idx="2">
-            <a:schemeClr val="accent1"/>
-          </a:lnRef>
-          <a:fillRef idx="0">
-            <a:schemeClr val="accent1"/>
-          </a:fillRef>
-          <a:effectRef idx="1">
-            <a:schemeClr val="accent1"/>
-          </a:effectRef>
-          <a:fontRef idx="minor">
-            <a:schemeClr val="tx1"/>
-          </a:fontRef>
-        </p:style>
-        <p:txBody>
-          <a:bodyPr rtlCol="0" anchor="ctr"/>
-          <a:lstStyle/>
-          <a:p>
-            <a:pPr algn="ctr"/>
-            <a:endParaRPr lang="en-US"/>
+              <a:t> for CASTLE</a:t>
+            </a:r>
+            <a:endParaRPr lang="en-US" sz="2800" b="1" dirty="0">
+              <a:latin typeface="Candara" panose="020E0502030303020204" pitchFamily="34" charset="0"/>
+            </a:endParaRPr>
           </a:p>
         </p:txBody>
       </p:sp>
     </p:spTree>
     <p:extLst>
       <p:ext uri="{BB962C8B-B14F-4D97-AF65-F5344CB8AC3E}">
-        <p14:creationId xmlns:p14="http://schemas.microsoft.com/office/powerpoint/2010/main" val="990841197"/>
+        <p14:creationId xmlns:p14="http://schemas.microsoft.com/office/powerpoint/2010/main" val="2659663936"/>
       </p:ext>
     </p:extLst>
   </p:cSld>
@@ -41058,7 +40860,7 @@
           <p:cNvPr id="2" name="Title 1">
             <a:extLst>
               <a:ext uri="{FF2B5EF4-FFF2-40B4-BE49-F238E27FC236}">
-                <a16:creationId xmlns:a16="http://schemas.microsoft.com/office/drawing/2014/main" id="{1C40FE84-3155-C174-2054-DA88861F1291}"/>
+                <a16:creationId xmlns:a16="http://schemas.microsoft.com/office/drawing/2014/main" id="{F253036A-D263-8089-3616-A9B78162423E}"/>
               </a:ext>
             </a:extLst>
           </p:cNvPr>
@@ -41069,26 +40871,54 @@
             <p:ph type="title"/>
           </p:nvPr>
         </p:nvSpPr>
-        <p:spPr/>
-        <p:txBody>
-          <a:bodyPr/>
+        <p:spPr>
+          <a:xfrm>
+            <a:off x="839788" y="122396"/>
+            <a:ext cx="10515600" cy="1325563"/>
+          </a:xfrm>
+        </p:spPr>
+        <p:txBody>
+          <a:bodyPr>
+            <a:normAutofit/>
+          </a:bodyPr>
           <a:lstStyle/>
           <a:p>
             <a:r>
-              <a:rPr lang="en-US">
+              <a:rPr lang="fr-FR" sz="3600" dirty="0" err="1">
                 <a:latin typeface="Candara" panose="020E0502030303020204" pitchFamily="34" charset="0"/>
               </a:rPr>
-              <a:t>How would CASTLE work ?</a:t>
-            </a:r>
-          </a:p>
-        </p:txBody>
-      </p:sp>
-      <p:sp>
-        <p:nvSpPr>
-          <p:cNvPr id="3" name="Content Placeholder 2">
-            <a:extLst>
-              <a:ext uri="{FF2B5EF4-FFF2-40B4-BE49-F238E27FC236}">
-                <a16:creationId xmlns:a16="http://schemas.microsoft.com/office/drawing/2014/main" id="{492C7A00-BD24-87CA-BF96-3C157548D9D8}"/>
+              <a:t>What</a:t>
+            </a:r>
+            <a:r>
+              <a:rPr lang="fr-FR" sz="3600" dirty="0">
+                <a:latin typeface="Candara" panose="020E0502030303020204" pitchFamily="34" charset="0"/>
+              </a:rPr>
+              <a:t> are </a:t>
+            </a:r>
+            <a:r>
+              <a:rPr lang="fr-FR" sz="3600" dirty="0" err="1">
+                <a:latin typeface="Candara" panose="020E0502030303020204" pitchFamily="34" charset="0"/>
+              </a:rPr>
+              <a:t>CASTLE’s</a:t>
+            </a:r>
+            <a:r>
+              <a:rPr lang="fr-FR" sz="3600" dirty="0">
+                <a:latin typeface="Candara" panose="020E0502030303020204" pitchFamily="34" charset="0"/>
+              </a:rPr>
+              <a:t> goals ? </a:t>
+            </a:r>
+            <a:endParaRPr lang="en-US" sz="3600" dirty="0">
+              <a:latin typeface="Candara" panose="020E0502030303020204" pitchFamily="34" charset="0"/>
+            </a:endParaRPr>
+          </a:p>
+        </p:txBody>
+      </p:sp>
+      <p:sp>
+        <p:nvSpPr>
+          <p:cNvPr id="9" name="Text Placeholder 8">
+            <a:extLst>
+              <a:ext uri="{FF2B5EF4-FFF2-40B4-BE49-F238E27FC236}">
+                <a16:creationId xmlns:a16="http://schemas.microsoft.com/office/drawing/2014/main" id="{9522DEF8-9AD8-3DE1-B9EB-9A85FAE9AEAD}"/>
               </a:ext>
             </a:extLst>
           </p:cNvPr>
@@ -41096,100 +40926,369 @@
             <a:spLocks noGrp="1"/>
           </p:cNvSpPr>
           <p:nvPr>
-            <p:ph idx="1"/>
+            <p:ph type="body" idx="1"/>
           </p:nvPr>
         </p:nvSpPr>
-        <p:spPr>
-          <a:xfrm>
-            <a:off x="838200" y="1944369"/>
-            <a:ext cx="10515600" cy="3369311"/>
-          </a:xfrm>
-        </p:spPr>
-        <p:txBody>
-          <a:bodyPr anchor="ctr">
-            <a:normAutofit/>
-          </a:bodyPr>
+        <p:spPr/>
+        <p:txBody>
+          <a:bodyPr/>
           <a:lstStyle/>
           <a:p>
-            <a:pPr marL="457200" indent="-457200">
-              <a:buFont typeface="+mj-lt"/>
-              <a:buAutoNum type="arabicPeriod"/>
-            </a:pPr>
-            <a:r>
-              <a:rPr lang="en-US" b="1" dirty="0">
+            <a:r>
+              <a:rPr lang="fr-FR" b="0" u="sng" dirty="0">
                 <a:latin typeface="Candara" panose="020E0502030303020204" pitchFamily="34" charset="0"/>
               </a:rPr>
-              <a:t>Deferred Acceptance </a:t>
-            </a:r>
-            <a:r>
-              <a:rPr lang="en-US" dirty="0">
+              <a:t>Professor </a:t>
+            </a:r>
+            <a:r>
+              <a:rPr lang="fr-FR" b="0" u="sng" dirty="0" err="1">
                 <a:latin typeface="Candara" panose="020E0502030303020204" pitchFamily="34" charset="0"/>
               </a:rPr>
-              <a:t>Algorithm</a:t>
-            </a:r>
-          </a:p>
-          <a:p>
-            <a:pPr marL="457200" indent="-457200">
-              <a:buFont typeface="+mj-lt"/>
-              <a:buAutoNum type="arabicPeriod"/>
+              <a:t>Side</a:t>
+            </a:r>
+            <a:endParaRPr lang="en-US" b="0" u="sng" dirty="0">
+              <a:latin typeface="Candara" panose="020E0502030303020204" pitchFamily="34" charset="0"/>
+            </a:endParaRPr>
+          </a:p>
+        </p:txBody>
+      </p:sp>
+      <p:sp>
+        <p:nvSpPr>
+          <p:cNvPr id="3" name="Content Placeholder 2">
+            <a:extLst>
+              <a:ext uri="{FF2B5EF4-FFF2-40B4-BE49-F238E27FC236}">
+                <a16:creationId xmlns:a16="http://schemas.microsoft.com/office/drawing/2014/main" id="{722E4B27-BFAD-9D17-B41D-FE18298D3DA4}"/>
+              </a:ext>
+            </a:extLst>
+          </p:cNvPr>
+          <p:cNvSpPr>
+            <a:spLocks noGrp="1"/>
+          </p:cNvSpPr>
+          <p:nvPr>
+            <p:ph sz="half" idx="2"/>
+          </p:nvPr>
+        </p:nvSpPr>
+        <p:spPr>
+          <a:xfrm>
+            <a:off x="839788" y="2738279"/>
+            <a:ext cx="5157787" cy="3684588"/>
+          </a:xfrm>
+        </p:spPr>
+        <p:txBody>
+          <a:bodyPr anchor="t"/>
+          <a:lstStyle/>
+          <a:p>
+            <a:pPr marL="342900" indent="-342900">
+              <a:buFont typeface="Arial" panose="020B0604020202020204" pitchFamily="34" charset="0"/>
+              <a:buChar char="•"/>
             </a:pPr>
             <a:r>
-              <a:rPr lang="en-US" dirty="0">
+              <a:rPr lang="fr-FR" sz="2400" dirty="0">
                 <a:latin typeface="Candara" panose="020E0502030303020204" pitchFamily="34" charset="0"/>
               </a:rPr>
-              <a:t>Matches the Teachers and the Classrooms</a:t>
-            </a:r>
-          </a:p>
-          <a:p>
-            <a:pPr lvl="1"/>
-            <a:r>
-              <a:rPr lang="en-US" dirty="0">
+              <a:t>Profs can </a:t>
+            </a:r>
+            <a:r>
+              <a:rPr lang="fr-FR" sz="2400" b="1" dirty="0">
                 <a:latin typeface="Candara" panose="020E0502030303020204" pitchFamily="34" charset="0"/>
               </a:rPr>
-              <a:t>	Teachers emit preferences on the type of rooms</a:t>
-            </a:r>
-          </a:p>
-          <a:p>
-            <a:pPr lvl="1"/>
-            <a:r>
-              <a:rPr lang="en-US" dirty="0">
+              <a:t>have a </a:t>
+            </a:r>
+            <a:r>
+              <a:rPr lang="fr-FR" sz="2400" b="1" dirty="0" err="1">
                 <a:latin typeface="Candara" panose="020E0502030303020204" pitchFamily="34" charset="0"/>
               </a:rPr>
-              <a:t>	Rooms consider the fill factor of the class</a:t>
-            </a:r>
-          </a:p>
-          <a:p>
-            <a:pPr marL="457200" indent="-457200">
-              <a:buFont typeface="+mj-lt"/>
-              <a:buAutoNum type="arabicPeriod"/>
-            </a:pPr>
-            <a:r>
-              <a:rPr lang="en-US" dirty="0">
+              <a:t>say</a:t>
+            </a:r>
+            <a:r>
+              <a:rPr lang="fr-FR" sz="2400" b="1" dirty="0">
                 <a:latin typeface="Candara" panose="020E0502030303020204" pitchFamily="34" charset="0"/>
               </a:rPr>
-              <a:t>Teacher Proposing DA</a:t>
-            </a:r>
-          </a:p>
-          <a:p>
-            <a:pPr marL="457200" indent="-457200">
-              <a:buFont typeface="+mj-lt"/>
-              <a:buAutoNum type="arabicPeriod"/>
-            </a:pPr>
-            <a:r>
-              <a:rPr lang="en-US" dirty="0">
+              <a:t> </a:t>
+            </a:r>
+            <a:r>
+              <a:rPr lang="fr-FR" sz="2400" dirty="0">
                 <a:latin typeface="Candara" panose="020E0502030303020204" pitchFamily="34" charset="0"/>
               </a:rPr>
-              <a:t>If professors are left : Serial Dictatorship on remaining rooms</a:t>
-            </a:r>
-          </a:p>
-        </p:txBody>
-      </p:sp>
-      <p:sp>
-        <p:nvSpPr>
-          <p:cNvPr id="5" name="TextBox 4">
-            <a:extLst>
-              <a:ext uri="{FF2B5EF4-FFF2-40B4-BE49-F238E27FC236}">
-                <a16:creationId xmlns:a16="http://schemas.microsoft.com/office/drawing/2014/main" id="{51E9B55D-847D-5164-0822-A982CD67C634}"/>
+              <a:t>in the </a:t>
+            </a:r>
+            <a:r>
+              <a:rPr lang="fr-FR" sz="2400" dirty="0" err="1">
+                <a:latin typeface="Candara" panose="020E0502030303020204" pitchFamily="34" charset="0"/>
+              </a:rPr>
+              <a:t>classroom</a:t>
+            </a:r>
+            <a:r>
+              <a:rPr lang="fr-FR" sz="2400" dirty="0">
+                <a:latin typeface="Candara" panose="020E0502030303020204" pitchFamily="34" charset="0"/>
+              </a:rPr>
+              <a:t> allocation</a:t>
+            </a:r>
+          </a:p>
+          <a:p>
+            <a:pPr marL="342900" indent="-342900">
+              <a:buFont typeface="Arial" panose="020B0604020202020204" pitchFamily="34" charset="0"/>
+              <a:buChar char="•"/>
+            </a:pPr>
+            <a:r>
+              <a:rPr lang="fr-FR" sz="2400" b="1" dirty="0" err="1">
+                <a:latin typeface="Candara" panose="020E0502030303020204" pitchFamily="34" charset="0"/>
+              </a:rPr>
+              <a:t>Prioritize</a:t>
+            </a:r>
+            <a:r>
+              <a:rPr lang="fr-FR" sz="2400" b="1" dirty="0">
+                <a:latin typeface="Candara" panose="020E0502030303020204" pitchFamily="34" charset="0"/>
+              </a:rPr>
+              <a:t> </a:t>
+            </a:r>
+            <a:r>
+              <a:rPr lang="fr-FR" sz="2400" dirty="0">
+                <a:latin typeface="Candara" panose="020E0502030303020204" pitchFamily="34" charset="0"/>
+              </a:rPr>
+              <a:t>and </a:t>
+            </a:r>
+            <a:r>
+              <a:rPr lang="fr-FR" sz="2400" b="1" dirty="0">
+                <a:latin typeface="Candara" panose="020E0502030303020204" pitchFamily="34" charset="0"/>
+              </a:rPr>
+              <a:t>signal</a:t>
+            </a:r>
+            <a:r>
+              <a:rPr lang="fr-FR" sz="2400" dirty="0">
+                <a:latin typeface="Candara" panose="020E0502030303020204" pitchFamily="34" charset="0"/>
+              </a:rPr>
+              <a:t> </a:t>
+            </a:r>
+            <a:r>
+              <a:rPr lang="fr-FR" sz="2400" dirty="0" err="1">
+                <a:latin typeface="Candara" panose="020E0502030303020204" pitchFamily="34" charset="0"/>
+              </a:rPr>
+              <a:t>their</a:t>
+            </a:r>
+            <a:r>
+              <a:rPr lang="fr-FR" sz="2400" dirty="0">
+                <a:latin typeface="Candara" panose="020E0502030303020204" pitchFamily="34" charset="0"/>
+              </a:rPr>
+              <a:t> room </a:t>
+            </a:r>
+            <a:r>
+              <a:rPr lang="fr-FR" sz="2400" dirty="0" err="1">
+                <a:latin typeface="Candara" panose="020E0502030303020204" pitchFamily="34" charset="0"/>
+              </a:rPr>
+              <a:t>preferences</a:t>
+            </a:r>
+            <a:endParaRPr lang="fr-FR" sz="2400" dirty="0">
+              <a:latin typeface="Candara" panose="020E0502030303020204" pitchFamily="34" charset="0"/>
+            </a:endParaRPr>
+          </a:p>
+          <a:p>
+            <a:endParaRPr lang="fr-FR" dirty="0">
+              <a:latin typeface="Candara" panose="020E0502030303020204" pitchFamily="34" charset="0"/>
+            </a:endParaRPr>
+          </a:p>
+        </p:txBody>
+      </p:sp>
+      <p:sp>
+        <p:nvSpPr>
+          <p:cNvPr id="10" name="Text Placeholder 9">
+            <a:extLst>
+              <a:ext uri="{FF2B5EF4-FFF2-40B4-BE49-F238E27FC236}">
+                <a16:creationId xmlns:a16="http://schemas.microsoft.com/office/drawing/2014/main" id="{5AC2D7C7-B573-DCA6-DFD1-00A062EB6C12}"/>
+              </a:ext>
+            </a:extLst>
+          </p:cNvPr>
+          <p:cNvSpPr>
+            <a:spLocks noGrp="1"/>
+          </p:cNvSpPr>
+          <p:nvPr>
+            <p:ph type="body" sz="quarter" idx="3"/>
+          </p:nvPr>
+        </p:nvSpPr>
+        <p:spPr/>
+        <p:txBody>
+          <a:bodyPr/>
+          <a:lstStyle/>
+          <a:p>
+            <a:r>
+              <a:rPr lang="fr-FR" b="0" u="sng" dirty="0">
+                <a:latin typeface="Candara" panose="020E0502030303020204" pitchFamily="34" charset="0"/>
+              </a:rPr>
+              <a:t>Administration </a:t>
+            </a:r>
+            <a:r>
+              <a:rPr lang="fr-FR" b="0" u="sng" dirty="0" err="1">
+                <a:latin typeface="Candara" panose="020E0502030303020204" pitchFamily="34" charset="0"/>
+              </a:rPr>
+              <a:t>Side</a:t>
+            </a:r>
+            <a:endParaRPr lang="en-US" b="0" u="sng" dirty="0">
+              <a:latin typeface="Candara" panose="020E0502030303020204" pitchFamily="34" charset="0"/>
+            </a:endParaRPr>
+          </a:p>
+        </p:txBody>
+      </p:sp>
+      <p:sp>
+        <p:nvSpPr>
+          <p:cNvPr id="8" name="Content Placeholder 7">
+            <a:extLst>
+              <a:ext uri="{FF2B5EF4-FFF2-40B4-BE49-F238E27FC236}">
+                <a16:creationId xmlns:a16="http://schemas.microsoft.com/office/drawing/2014/main" id="{E778B19C-75FD-CB78-A4BF-5DF8EBC72D6B}"/>
+              </a:ext>
+            </a:extLst>
+          </p:cNvPr>
+          <p:cNvSpPr>
+            <a:spLocks noGrp="1"/>
+          </p:cNvSpPr>
+          <p:nvPr>
+            <p:ph sz="quarter" idx="4"/>
+          </p:nvPr>
+        </p:nvSpPr>
+        <p:spPr>
+          <a:xfrm>
+            <a:off x="6172200" y="2738279"/>
+            <a:ext cx="5183188" cy="3684588"/>
+          </a:xfrm>
+        </p:spPr>
+        <p:txBody>
+          <a:bodyPr anchor="t"/>
+          <a:lstStyle/>
+          <a:p>
+            <a:pPr marL="342900" indent="-342900">
+              <a:buFont typeface="Arial" panose="020B0604020202020204" pitchFamily="34" charset="0"/>
+              <a:buChar char="•"/>
+            </a:pPr>
+            <a:r>
+              <a:rPr lang="fr-FR" sz="2400" b="1" dirty="0" err="1">
+                <a:latin typeface="Candara" panose="020E0502030303020204" pitchFamily="34" charset="0"/>
+              </a:rPr>
+              <a:t>Ease</a:t>
+            </a:r>
+            <a:r>
+              <a:rPr lang="fr-FR" sz="2400" b="1" dirty="0">
+                <a:latin typeface="Candara" panose="020E0502030303020204" pitchFamily="34" charset="0"/>
+              </a:rPr>
+              <a:t> the </a:t>
+            </a:r>
+            <a:r>
+              <a:rPr lang="fr-FR" sz="2400" b="1" dirty="0" err="1">
+                <a:latin typeface="Candara" panose="020E0502030303020204" pitchFamily="34" charset="0"/>
+              </a:rPr>
+              <a:t>load</a:t>
+            </a:r>
+            <a:r>
+              <a:rPr lang="fr-FR" sz="2400" b="1" dirty="0">
+                <a:latin typeface="Candara" panose="020E0502030303020204" pitchFamily="34" charset="0"/>
+              </a:rPr>
+              <a:t> </a:t>
+            </a:r>
+            <a:r>
+              <a:rPr lang="fr-FR" sz="2400" dirty="0">
+                <a:latin typeface="Candara" panose="020E0502030303020204" pitchFamily="34" charset="0"/>
+              </a:rPr>
+              <a:t>on the </a:t>
+            </a:r>
+            <a:r>
+              <a:rPr lang="fr-FR" sz="2400" dirty="0" err="1">
+                <a:latin typeface="Candara" panose="020E0502030303020204" pitchFamily="34" charset="0"/>
+              </a:rPr>
+              <a:t>Registrar’s</a:t>
+            </a:r>
+            <a:r>
+              <a:rPr lang="fr-FR" sz="2400" dirty="0">
+                <a:latin typeface="Candara" panose="020E0502030303020204" pitchFamily="34" charset="0"/>
+              </a:rPr>
+              <a:t> office</a:t>
+            </a:r>
+          </a:p>
+          <a:p>
+            <a:pPr marL="342900" indent="-342900">
+              <a:buFont typeface="Arial" panose="020B0604020202020204" pitchFamily="34" charset="0"/>
+              <a:buChar char="•"/>
+            </a:pPr>
+            <a:r>
+              <a:rPr lang="fr-FR" sz="2400" b="1" dirty="0">
+                <a:latin typeface="Candara" panose="020E0502030303020204" pitchFamily="34" charset="0"/>
+              </a:rPr>
+              <a:t>Efficient</a:t>
+            </a:r>
+            <a:r>
+              <a:rPr lang="fr-FR" sz="2400" dirty="0">
+                <a:latin typeface="Candara" panose="020E0502030303020204" pitchFamily="34" charset="0"/>
+              </a:rPr>
+              <a:t> allocation of the  </a:t>
+            </a:r>
+            <a:r>
+              <a:rPr lang="fr-FR" sz="2400" dirty="0" err="1">
+                <a:latin typeface="Candara" panose="020E0502030303020204" pitchFamily="34" charset="0"/>
+              </a:rPr>
+              <a:t>school’s</a:t>
+            </a:r>
+            <a:r>
+              <a:rPr lang="fr-FR" sz="2400" dirty="0">
+                <a:latin typeface="Candara" panose="020E0502030303020204" pitchFamily="34" charset="0"/>
+              </a:rPr>
+              <a:t> ressources</a:t>
+            </a:r>
+            <a:endParaRPr lang="en-US" sz="2400" dirty="0">
+              <a:latin typeface="Candara" panose="020E0502030303020204" pitchFamily="34" charset="0"/>
+            </a:endParaRPr>
+          </a:p>
+          <a:p>
+            <a:endParaRPr lang="en-US" dirty="0"/>
+          </a:p>
+        </p:txBody>
+      </p:sp>
+      <p:sp>
+        <p:nvSpPr>
+          <p:cNvPr id="4" name="Right Brace 3">
+            <a:extLst>
+              <a:ext uri="{FF2B5EF4-FFF2-40B4-BE49-F238E27FC236}">
+                <a16:creationId xmlns:a16="http://schemas.microsoft.com/office/drawing/2014/main" id="{1A06DA47-E5A1-6231-BBB9-C334A25F376A}"/>
+              </a:ext>
+            </a:extLst>
+          </p:cNvPr>
+          <p:cNvSpPr/>
+          <p:nvPr/>
+        </p:nvSpPr>
+        <p:spPr>
+          <a:xfrm rot="5400000">
+            <a:off x="3257866" y="2557146"/>
+            <a:ext cx="315277" cy="5157786"/>
+          </a:xfrm>
+          <a:prstGeom prst="rightBrace">
+            <a:avLst/>
+          </a:prstGeom>
+        </p:spPr>
+        <p:style>
+          <a:lnRef idx="2">
+            <a:schemeClr val="accent1"/>
+          </a:lnRef>
+          <a:fillRef idx="0">
+            <a:schemeClr val="accent1"/>
+          </a:fillRef>
+          <a:effectRef idx="1">
+            <a:schemeClr val="accent1"/>
+          </a:effectRef>
+          <a:fontRef idx="minor">
+            <a:schemeClr val="tx1"/>
+          </a:fontRef>
+        </p:style>
+        <p:txBody>
+          <a:bodyPr rtlCol="0" anchor="ctr"/>
+          <a:lstStyle/>
+          <a:p>
+            <a:pPr algn="ctr"/>
+            <a:endParaRPr lang="en-US"/>
+          </a:p>
+        </p:txBody>
+      </p:sp>
+      <p:sp>
+        <p:nvSpPr>
+          <p:cNvPr id="6" name="TextBox 5">
+            <a:extLst>
+              <a:ext uri="{FF2B5EF4-FFF2-40B4-BE49-F238E27FC236}">
+                <a16:creationId xmlns:a16="http://schemas.microsoft.com/office/drawing/2014/main" id="{F6760039-53C2-EA9B-E002-DDDB105B39E9}"/>
               </a:ext>
             </a:extLst>
           </p:cNvPr>
@@ -41198,8 +41297,8 @@
         </p:nvSpPr>
         <p:spPr>
           <a:xfrm>
-            <a:off x="966945" y="5498600"/>
-            <a:ext cx="10258109" cy="954107"/>
+            <a:off x="836611" y="5405119"/>
+            <a:ext cx="10258109" cy="523220"/>
           </a:xfrm>
           <a:prstGeom prst="rect">
             <a:avLst/>
@@ -41214,52 +41313,10 @@
           <a:p>
             <a:pPr algn="ctr"/>
             <a:r>
-              <a:rPr lang="fr-FR" sz="2800" b="1" dirty="0">
-                <a:latin typeface="Candara" panose="020E0502030303020204" pitchFamily="34" charset="0"/>
-              </a:rPr>
-              <a:t>A </a:t>
-            </a:r>
-            <a:r>
-              <a:rPr lang="en-US" sz="2800" b="1" dirty="0">
-                <a:latin typeface="Candara" panose="020E0502030303020204" pitchFamily="34" charset="0"/>
-              </a:rPr>
-              <a:t>proven</a:t>
-            </a:r>
-            <a:r>
-              <a:rPr lang="fr-FR" sz="2800" b="1" dirty="0">
-                <a:latin typeface="Candara" panose="020E0502030303020204" pitchFamily="34" charset="0"/>
-              </a:rPr>
-              <a:t> Matching system </a:t>
-            </a:r>
-            <a:r>
               <a:rPr lang="fr-FR" sz="2800" b="1" dirty="0" err="1">
                 <a:latin typeface="Candara" panose="020E0502030303020204" pitchFamily="34" charset="0"/>
               </a:rPr>
-              <a:t>aiming</a:t>
-            </a:r>
-            <a:r>
-              <a:rPr lang="fr-FR" sz="2800" b="1" dirty="0">
-                <a:latin typeface="Candara" panose="020E0502030303020204" pitchFamily="34" charset="0"/>
-              </a:rPr>
-              <a:t> to </a:t>
-            </a:r>
-            <a:r>
-              <a:rPr lang="fr-FR" sz="2800" b="1" dirty="0" err="1">
-                <a:latin typeface="Candara" panose="020E0502030303020204" pitchFamily="34" charset="0"/>
-              </a:rPr>
-              <a:t>increase</a:t>
-            </a:r>
-            <a:r>
-              <a:rPr lang="fr-FR" sz="2800" b="1" dirty="0">
-                <a:latin typeface="Candara" panose="020E0502030303020204" pitchFamily="34" charset="0"/>
-              </a:rPr>
-              <a:t> satisfaction and </a:t>
-            </a:r>
-            <a:r>
-              <a:rPr lang="fr-FR" sz="2800" b="1" dirty="0" err="1">
-                <a:latin typeface="Candara" panose="020E0502030303020204" pitchFamily="34" charset="0"/>
-              </a:rPr>
-              <a:t>better</a:t>
+              <a:t>Considers</a:t>
             </a:r>
             <a:r>
               <a:rPr lang="fr-FR" sz="2800" b="1" dirty="0">
@@ -41271,7 +41328,31 @@
               <a:rPr lang="fr-FR" sz="2800" b="1" dirty="0" err="1">
                 <a:latin typeface="Candara" panose="020E0502030303020204" pitchFamily="34" charset="0"/>
               </a:rPr>
-              <a:t>allocate</a:t>
+              <a:t>Professors</a:t>
+            </a:r>
+            <a:r>
+              <a:rPr lang="fr-FR" sz="2800" b="1" dirty="0">
+                <a:latin typeface="Candara" panose="020E0502030303020204" pitchFamily="34" charset="0"/>
+              </a:rPr>
+              <a:t>’ </a:t>
+            </a:r>
+            <a:r>
+              <a:rPr lang="fr-FR" sz="2800" b="1" dirty="0" err="1">
+                <a:latin typeface="Candara" panose="020E0502030303020204" pitchFamily="34" charset="0"/>
+              </a:rPr>
+              <a:t>preferences</a:t>
+            </a:r>
+            <a:r>
+              <a:rPr lang="fr-FR" sz="2800" b="1" dirty="0">
+                <a:latin typeface="Candara" panose="020E0502030303020204" pitchFamily="34" charset="0"/>
+              </a:rPr>
+              <a:t>…</a:t>
+            </a:r>
+            <a:r>
+              <a:rPr lang="fr-FR" sz="2800" b="1" dirty="0" err="1">
+                <a:latin typeface="Candara" panose="020E0502030303020204" pitchFamily="34" charset="0"/>
+              </a:rPr>
+              <a:t>while</a:t>
             </a:r>
             <a:r>
               <a:rPr lang="fr-FR" sz="2800" b="1" dirty="0">
@@ -41283,21 +41364,77 @@
               <a:rPr lang="fr-FR" sz="2800" b="1" dirty="0" err="1">
                 <a:latin typeface="Candara" panose="020E0502030303020204" pitchFamily="34" charset="0"/>
               </a:rPr>
-              <a:t>school</a:t>
+              <a:t>being</a:t>
             </a:r>
             <a:r>
               <a:rPr lang="fr-FR" sz="2800" b="1" dirty="0">
                 <a:latin typeface="Candara" panose="020E0502030303020204" pitchFamily="34" charset="0"/>
               </a:rPr>
-              <a:t> ressources</a:t>
-            </a:r>
+              <a:t> </a:t>
+            </a:r>
+            <a:r>
+              <a:rPr lang="fr-FR" sz="2800" b="1" dirty="0" err="1">
+                <a:latin typeface="Candara" panose="020E0502030303020204" pitchFamily="34" charset="0"/>
+              </a:rPr>
+              <a:t>easier</a:t>
+            </a:r>
+            <a:r>
+              <a:rPr lang="fr-FR" sz="2800" b="1" dirty="0">
+                <a:latin typeface="Candara" panose="020E0502030303020204" pitchFamily="34" charset="0"/>
+              </a:rPr>
+              <a:t> to plan out</a:t>
+            </a:r>
+          </a:p>
+        </p:txBody>
+      </p:sp>
+      <p:sp>
+        <p:nvSpPr>
+          <p:cNvPr id="11" name="Right Brace 10">
+            <a:extLst>
+              <a:ext uri="{FF2B5EF4-FFF2-40B4-BE49-F238E27FC236}">
+                <a16:creationId xmlns:a16="http://schemas.microsoft.com/office/drawing/2014/main" id="{29DD95DA-D4CE-34D7-B056-7878F577F1D1}"/>
+              </a:ext>
+            </a:extLst>
+          </p:cNvPr>
+          <p:cNvSpPr/>
+          <p:nvPr/>
+        </p:nvSpPr>
+        <p:spPr>
+          <a:xfrm rot="5400000">
+            <a:off x="8539322" y="2557146"/>
+            <a:ext cx="315277" cy="5157786"/>
+          </a:xfrm>
+          <a:prstGeom prst="rightBrace">
+            <a:avLst/>
+          </a:prstGeom>
+        </p:spPr>
+        <p:style>
+          <a:lnRef idx="2">
+            <a:schemeClr val="accent1"/>
+          </a:lnRef>
+          <a:fillRef idx="0">
+            <a:schemeClr val="accent1"/>
+          </a:fillRef>
+          <a:effectRef idx="1">
+            <a:schemeClr val="accent1"/>
+          </a:effectRef>
+          <a:fontRef idx="minor">
+            <a:schemeClr val="tx1"/>
+          </a:fontRef>
+        </p:style>
+        <p:txBody>
+          <a:bodyPr rtlCol="0" anchor="ctr"/>
+          <a:lstStyle/>
+          <a:p>
+            <a:pPr algn="ctr"/>
+            <a:endParaRPr lang="en-US"/>
           </a:p>
         </p:txBody>
       </p:sp>
     </p:spTree>
     <p:extLst>
       <p:ext uri="{BB962C8B-B14F-4D97-AF65-F5344CB8AC3E}">
-        <p14:creationId xmlns:p14="http://schemas.microsoft.com/office/powerpoint/2010/main" val="1864240373"/>
+        <p14:creationId xmlns:p14="http://schemas.microsoft.com/office/powerpoint/2010/main" val="990841197"/>
       </p:ext>
     </p:extLst>
   </p:cSld>
@@ -41329,7 +41466,7 @@
           <p:cNvPr id="2" name="Title 1">
             <a:extLst>
               <a:ext uri="{FF2B5EF4-FFF2-40B4-BE49-F238E27FC236}">
-                <a16:creationId xmlns:a16="http://schemas.microsoft.com/office/drawing/2014/main" id="{08ED9F9B-9F3E-B88D-CE67-4407710620A0}"/>
+                <a16:creationId xmlns:a16="http://schemas.microsoft.com/office/drawing/2014/main" id="{1C40FE84-3155-C174-2054-DA88861F1291}"/>
               </a:ext>
             </a:extLst>
           </p:cNvPr>
@@ -41348,60 +41485,121 @@
           <a:lstStyle/>
           <a:p>
             <a:r>
-              <a:rPr lang="fr-FR" sz="2800" dirty="0">
+              <a:rPr lang="en-US" sz="3600">
                 <a:latin typeface="Candara" panose="020E0502030303020204" pitchFamily="34" charset="0"/>
               </a:rPr>
-              <a:t>CASTLE </a:t>
-            </a:r>
-            <a:r>
-              <a:rPr lang="fr-FR" sz="2800" dirty="0" err="1">
+              <a:t>How would CASTLE work ?</a:t>
+            </a:r>
+          </a:p>
+        </p:txBody>
+      </p:sp>
+      <p:sp>
+        <p:nvSpPr>
+          <p:cNvPr id="3" name="Content Placeholder 2">
+            <a:extLst>
+              <a:ext uri="{FF2B5EF4-FFF2-40B4-BE49-F238E27FC236}">
+                <a16:creationId xmlns:a16="http://schemas.microsoft.com/office/drawing/2014/main" id="{492C7A00-BD24-87CA-BF96-3C157548D9D8}"/>
+              </a:ext>
+            </a:extLst>
+          </p:cNvPr>
+          <p:cNvSpPr>
+            <a:spLocks noGrp="1"/>
+          </p:cNvSpPr>
+          <p:nvPr>
+            <p:ph idx="1"/>
+          </p:nvPr>
+        </p:nvSpPr>
+        <p:spPr>
+          <a:xfrm>
+            <a:off x="838200" y="1751104"/>
+            <a:ext cx="10515600" cy="3369311"/>
+          </a:xfrm>
+        </p:spPr>
+        <p:txBody>
+          <a:bodyPr anchor="ctr">
+            <a:normAutofit/>
+          </a:bodyPr>
+          <a:lstStyle/>
+          <a:p>
+            <a:pPr marL="457200" indent="-457200">
+              <a:buFont typeface="+mj-lt"/>
+              <a:buAutoNum type="arabicPeriod"/>
+            </a:pPr>
+            <a:r>
+              <a:rPr lang="en-US" b="1" dirty="0">
                 <a:latin typeface="Candara" panose="020E0502030303020204" pitchFamily="34" charset="0"/>
               </a:rPr>
-              <a:t>Properties</a:t>
-            </a:r>
-            <a:endParaRPr lang="en-US" sz="2800" dirty="0">
-              <a:latin typeface="Candara" panose="020E0502030303020204" pitchFamily="34" charset="0"/>
-            </a:endParaRPr>
-          </a:p>
-        </p:txBody>
-      </p:sp>
-      <p:graphicFrame>
-        <p:nvGraphicFramePr>
-          <p:cNvPr id="4" name="Content Placeholder 3">
-            <a:extLst>
-              <a:ext uri="{FF2B5EF4-FFF2-40B4-BE49-F238E27FC236}">
-                <a16:creationId xmlns:a16="http://schemas.microsoft.com/office/drawing/2014/main" id="{5D8F7802-D5C6-D0B5-5CAD-45A8B4824B82}"/>
-              </a:ext>
-            </a:extLst>
-          </p:cNvPr>
-          <p:cNvGraphicFramePr>
-            <a:graphicFrameLocks noGrp="1"/>
-          </p:cNvGraphicFramePr>
-          <p:nvPr>
-            <p:ph idx="1"/>
-            <p:extLst>
-              <p:ext uri="{D42A27DB-BD31-4B8C-83A1-F6EECF244321}">
-                <p14:modId xmlns:p14="http://schemas.microsoft.com/office/powerpoint/2010/main" val="2785674918"/>
-              </p:ext>
-            </p:extLst>
-          </p:nvPr>
-        </p:nvGraphicFramePr>
-        <p:xfrm>
-          <a:off x="3196590" y="1467326"/>
-          <a:ext cx="5798820" cy="3923347"/>
-        </p:xfrm>
-        <a:graphic>
-          <a:graphicData uri="http://schemas.openxmlformats.org/drawingml/2006/diagram">
-            <dgm:relIds xmlns:dgm="http://schemas.openxmlformats.org/drawingml/2006/diagram" xmlns:r="http://schemas.openxmlformats.org/officeDocument/2006/relationships" r:dm="rId2" r:lo="rId3" r:qs="rId4" r:cs="rId5"/>
-          </a:graphicData>
-        </a:graphic>
-      </p:graphicFrame>
+              <a:t>Deferred Acceptance </a:t>
+            </a:r>
+            <a:r>
+              <a:rPr lang="en-US" dirty="0">
+                <a:latin typeface="Candara" panose="020E0502030303020204" pitchFamily="34" charset="0"/>
+              </a:rPr>
+              <a:t>Algorithm</a:t>
+            </a:r>
+          </a:p>
+          <a:p>
+            <a:pPr marL="457200" indent="-457200">
+              <a:buFont typeface="+mj-lt"/>
+              <a:buAutoNum type="arabicPeriod"/>
+            </a:pPr>
+            <a:r>
+              <a:rPr lang="en-US" dirty="0">
+                <a:latin typeface="Candara" panose="020E0502030303020204" pitchFamily="34" charset="0"/>
+              </a:rPr>
+              <a:t>Matches the Teachers and the Classrooms</a:t>
+            </a:r>
+          </a:p>
+          <a:p>
+            <a:pPr lvl="1"/>
+            <a:r>
+              <a:rPr lang="en-US" dirty="0">
+                <a:latin typeface="Candara" panose="020E0502030303020204" pitchFamily="34" charset="0"/>
+              </a:rPr>
+              <a:t>	Teachers emit preferences on the type of rooms</a:t>
+            </a:r>
+          </a:p>
+          <a:p>
+            <a:pPr lvl="1"/>
+            <a:r>
+              <a:rPr lang="en-US" dirty="0">
+                <a:latin typeface="Candara" panose="020E0502030303020204" pitchFamily="34" charset="0"/>
+              </a:rPr>
+              <a:t>	Rooms consider the fill factor of the class</a:t>
+            </a:r>
+          </a:p>
+          <a:p>
+            <a:pPr marL="457200" indent="-457200">
+              <a:buFont typeface="+mj-lt"/>
+              <a:buAutoNum type="arabicPeriod"/>
+            </a:pPr>
+            <a:r>
+              <a:rPr lang="en-US" dirty="0">
+                <a:latin typeface="Candara" panose="020E0502030303020204" pitchFamily="34" charset="0"/>
+              </a:rPr>
+              <a:t>Teacher Proposing DA</a:t>
+            </a:r>
+          </a:p>
+          <a:p>
+            <a:pPr marL="457200" indent="-457200">
+              <a:buFont typeface="+mj-lt"/>
+              <a:buAutoNum type="arabicPeriod"/>
+            </a:pPr>
+            <a:r>
+              <a:rPr lang="en-US" dirty="0">
+                <a:latin typeface="Candara" panose="020E0502030303020204" pitchFamily="34" charset="0"/>
+              </a:rPr>
+              <a:t>If professors are left : Serial Dictatorship on remaining rooms</a:t>
+            </a:r>
+          </a:p>
+        </p:txBody>
+      </p:sp>
       <p:sp>
         <p:nvSpPr>
           <p:cNvPr id="5" name="TextBox 4">
             <a:extLst>
               <a:ext uri="{FF2B5EF4-FFF2-40B4-BE49-F238E27FC236}">
-                <a16:creationId xmlns:a16="http://schemas.microsoft.com/office/drawing/2014/main" id="{EF0FBE8D-AB27-AA4E-7DAF-610BC10EFD1E}"/>
+                <a16:creationId xmlns:a16="http://schemas.microsoft.com/office/drawing/2014/main" id="{51E9B55D-847D-5164-0822-A982CD67C634}"/>
               </a:ext>
             </a:extLst>
           </p:cNvPr>
@@ -41410,8 +41608,8 @@
         </p:nvSpPr>
         <p:spPr>
           <a:xfrm>
-            <a:off x="7894320" y="2147583"/>
-            <a:ext cx="3362960" cy="646331"/>
+            <a:off x="966945" y="5327150"/>
+            <a:ext cx="10258109" cy="954107"/>
           </a:xfrm>
           <a:prstGeom prst="rect">
             <a:avLst/>
@@ -41419,286 +41617,70 @@
           <a:noFill/>
         </p:spPr>
         <p:txBody>
-          <a:bodyPr wrap="square" rtlCol="0">
+          <a:bodyPr wrap="square">
             <a:spAutoFit/>
           </a:bodyPr>
           <a:lstStyle/>
           <a:p>
-            <a:pPr marL="285750" indent="-285750">
-              <a:buFontTx/>
-              <a:buChar char="-"/>
-            </a:pPr>
-            <a:r>
-              <a:rPr lang="en-US" sz="1800" dirty="0">
-                <a:effectLst/>
-                <a:latin typeface="Candara" panose="020E0502030303020204" pitchFamily="34" charset="0"/>
-                <a:ea typeface="Aptos" panose="020B0004020202020204" pitchFamily="34" charset="0"/>
-                <a:cs typeface="Times New Roman" panose="02020603050405020304" pitchFamily="18" charset="0"/>
-              </a:rPr>
-              <a:t>Professor proposing DA makes it optimal</a:t>
-            </a:r>
-            <a:endParaRPr lang="en-US" dirty="0">
-              <a:latin typeface="Candara" panose="020E0502030303020204" pitchFamily="34" charset="0"/>
-            </a:endParaRPr>
-          </a:p>
-        </p:txBody>
-      </p:sp>
-      <p:sp>
-        <p:nvSpPr>
-          <p:cNvPr id="6" name="TextBox 5">
-            <a:extLst>
-              <a:ext uri="{FF2B5EF4-FFF2-40B4-BE49-F238E27FC236}">
-                <a16:creationId xmlns:a16="http://schemas.microsoft.com/office/drawing/2014/main" id="{9FBDF5EF-FE02-A954-2BAC-B9B1E6409528}"/>
-              </a:ext>
-            </a:extLst>
-          </p:cNvPr>
-          <p:cNvSpPr txBox="1"/>
-          <p:nvPr/>
-        </p:nvSpPr>
-        <p:spPr>
-          <a:xfrm>
-            <a:off x="1142538" y="2147583"/>
-            <a:ext cx="3362960" cy="646331"/>
-          </a:xfrm>
-          <a:prstGeom prst="rect">
-            <a:avLst/>
-          </a:prstGeom>
-          <a:noFill/>
-        </p:spPr>
-        <p:txBody>
-          <a:bodyPr wrap="square" rtlCol="0">
-            <a:spAutoFit/>
-          </a:bodyPr>
-          <a:lstStyle/>
-          <a:p>
-            <a:pPr marL="285750" indent="-285750">
-              <a:buFontTx/>
-              <a:buChar char="-"/>
-            </a:pPr>
-            <a:r>
-              <a:rPr lang="fr-FR" dirty="0">
-                <a:latin typeface="Candara" panose="020E0502030303020204" pitchFamily="34" charset="0"/>
-              </a:rPr>
-              <a:t>Strict </a:t>
-            </a:r>
-            <a:r>
-              <a:rPr lang="fr-FR" dirty="0" err="1">
-                <a:latin typeface="Candara" panose="020E0502030303020204" pitchFamily="34" charset="0"/>
-              </a:rPr>
-              <a:t>preferences</a:t>
-            </a:r>
-            <a:r>
-              <a:rPr lang="fr-FR" dirty="0">
-                <a:latin typeface="Candara" panose="020E0502030303020204" pitchFamily="34" charset="0"/>
-              </a:rPr>
-              <a:t> of </a:t>
-            </a:r>
-            <a:r>
-              <a:rPr lang="fr-FR" dirty="0" err="1">
-                <a:latin typeface="Candara" panose="020E0502030303020204" pitchFamily="34" charset="0"/>
-              </a:rPr>
-              <a:t>Rooms</a:t>
-            </a:r>
-            <a:r>
-              <a:rPr lang="fr-FR" dirty="0">
-                <a:latin typeface="Candara" panose="020E0502030303020204" pitchFamily="34" charset="0"/>
-              </a:rPr>
-              <a:t> and </a:t>
-            </a:r>
-            <a:r>
-              <a:rPr lang="fr-FR" dirty="0" err="1">
-                <a:latin typeface="Candara" panose="020E0502030303020204" pitchFamily="34" charset="0"/>
-              </a:rPr>
-              <a:t>Professors</a:t>
-            </a:r>
-            <a:endParaRPr lang="en-US" dirty="0">
-              <a:latin typeface="Candara" panose="020E0502030303020204" pitchFamily="34" charset="0"/>
-            </a:endParaRPr>
-          </a:p>
-        </p:txBody>
-      </p:sp>
-      <p:sp>
-        <p:nvSpPr>
-          <p:cNvPr id="7" name="TextBox 6">
-            <a:extLst>
-              <a:ext uri="{FF2B5EF4-FFF2-40B4-BE49-F238E27FC236}">
-                <a16:creationId xmlns:a16="http://schemas.microsoft.com/office/drawing/2014/main" id="{6E59BCDA-0AD2-815D-3E17-ADB3F069E74A}"/>
-              </a:ext>
-            </a:extLst>
-          </p:cNvPr>
-          <p:cNvSpPr txBox="1"/>
-          <p:nvPr/>
-        </p:nvSpPr>
-        <p:spPr>
-          <a:xfrm>
-            <a:off x="1142538" y="4003289"/>
-            <a:ext cx="3362960" cy="646331"/>
-          </a:xfrm>
-          <a:prstGeom prst="rect">
-            <a:avLst/>
-          </a:prstGeom>
-          <a:noFill/>
-        </p:spPr>
-        <p:txBody>
-          <a:bodyPr wrap="square" rtlCol="0">
-            <a:spAutoFit/>
-          </a:bodyPr>
-          <a:lstStyle/>
-          <a:p>
-            <a:pPr marL="285750" indent="-285750">
-              <a:buFontTx/>
-              <a:buChar char="-"/>
-            </a:pPr>
-            <a:r>
-              <a:rPr lang="fr-FR" dirty="0">
-                <a:latin typeface="Candara" panose="020E0502030303020204" pitchFamily="34" charset="0"/>
-              </a:rPr>
-              <a:t>Single, </a:t>
-            </a:r>
-            <a:r>
-              <a:rPr lang="fr-FR" dirty="0" err="1">
-                <a:latin typeface="Candara" panose="020E0502030303020204" pitchFamily="34" charset="0"/>
-              </a:rPr>
-              <a:t>confidential</a:t>
-            </a:r>
-            <a:r>
-              <a:rPr lang="fr-FR" dirty="0">
-                <a:latin typeface="Candara" panose="020E0502030303020204" pitchFamily="34" charset="0"/>
-              </a:rPr>
-              <a:t> and Central </a:t>
-            </a:r>
-            <a:r>
-              <a:rPr lang="fr-FR" dirty="0" err="1">
-                <a:latin typeface="Candara" panose="020E0502030303020204" pitchFamily="34" charset="0"/>
-              </a:rPr>
-              <a:t>Clearinghouse</a:t>
-            </a:r>
-            <a:endParaRPr lang="en-US" dirty="0">
-              <a:latin typeface="Candara" panose="020E0502030303020204" pitchFamily="34" charset="0"/>
-            </a:endParaRPr>
-          </a:p>
-        </p:txBody>
-      </p:sp>
-      <p:sp>
-        <p:nvSpPr>
-          <p:cNvPr id="8" name="TextBox 7">
-            <a:extLst>
-              <a:ext uri="{FF2B5EF4-FFF2-40B4-BE49-F238E27FC236}">
-                <a16:creationId xmlns:a16="http://schemas.microsoft.com/office/drawing/2014/main" id="{1DAFCE42-9D4D-AFCA-5A7D-1A73485F43B3}"/>
-              </a:ext>
-            </a:extLst>
-          </p:cNvPr>
-          <p:cNvSpPr txBox="1"/>
-          <p:nvPr/>
-        </p:nvSpPr>
-        <p:spPr>
-          <a:xfrm>
-            <a:off x="7894320" y="4003290"/>
-            <a:ext cx="3362960" cy="646331"/>
-          </a:xfrm>
-          <a:prstGeom prst="rect">
-            <a:avLst/>
-          </a:prstGeom>
-          <a:noFill/>
-        </p:spPr>
-        <p:txBody>
-          <a:bodyPr wrap="square" rtlCol="0">
-            <a:spAutoFit/>
-          </a:bodyPr>
-          <a:lstStyle/>
-          <a:p>
-            <a:pPr marL="285750" indent="-285750">
-              <a:buFontTx/>
-              <a:buChar char="-"/>
-            </a:pPr>
-            <a:r>
-              <a:rPr lang="fr-FR" dirty="0">
-                <a:latin typeface="Candara" panose="020E0502030303020204" pitchFamily="34" charset="0"/>
-              </a:rPr>
-              <a:t>Professor </a:t>
-            </a:r>
-            <a:r>
-              <a:rPr lang="fr-FR" dirty="0" err="1">
-                <a:latin typeface="Candara" panose="020E0502030303020204" pitchFamily="34" charset="0"/>
-              </a:rPr>
-              <a:t>proposing</a:t>
-            </a:r>
-            <a:r>
-              <a:rPr lang="fr-FR" dirty="0">
-                <a:latin typeface="Candara" panose="020E0502030303020204" pitchFamily="34" charset="0"/>
-              </a:rPr>
-              <a:t> and </a:t>
-            </a:r>
-            <a:r>
-              <a:rPr lang="fr-FR" dirty="0" err="1">
-                <a:latin typeface="Candara" panose="020E0502030303020204" pitchFamily="34" charset="0"/>
-              </a:rPr>
-              <a:t>fixed</a:t>
-            </a:r>
-            <a:r>
-              <a:rPr lang="fr-FR" dirty="0">
-                <a:latin typeface="Candara" panose="020E0502030303020204" pitchFamily="34" charset="0"/>
-              </a:rPr>
-              <a:t> </a:t>
-            </a:r>
-            <a:r>
-              <a:rPr lang="fr-FR" dirty="0" err="1">
-                <a:latin typeface="Candara" panose="020E0502030303020204" pitchFamily="34" charset="0"/>
-              </a:rPr>
-              <a:t>cohort</a:t>
-            </a:r>
-            <a:r>
-              <a:rPr lang="fr-FR" dirty="0">
-                <a:latin typeface="Candara" panose="020E0502030303020204" pitchFamily="34" charset="0"/>
-              </a:rPr>
-              <a:t> size</a:t>
-            </a:r>
-            <a:endParaRPr lang="en-US" dirty="0">
-              <a:latin typeface="Candara" panose="020E0502030303020204" pitchFamily="34" charset="0"/>
-            </a:endParaRPr>
-          </a:p>
-        </p:txBody>
-      </p:sp>
-      <p:sp>
-        <p:nvSpPr>
-          <p:cNvPr id="9" name="TextBox 8">
-            <a:extLst>
-              <a:ext uri="{FF2B5EF4-FFF2-40B4-BE49-F238E27FC236}">
-                <a16:creationId xmlns:a16="http://schemas.microsoft.com/office/drawing/2014/main" id="{9606F1ED-02C4-C5F7-1022-0C23D3E345FC}"/>
-              </a:ext>
-            </a:extLst>
-          </p:cNvPr>
-          <p:cNvSpPr txBox="1"/>
-          <p:nvPr/>
-        </p:nvSpPr>
-        <p:spPr>
-          <a:xfrm>
-            <a:off x="2194560" y="5701981"/>
-            <a:ext cx="7802880" cy="954107"/>
-          </a:xfrm>
-          <a:prstGeom prst="rect">
-            <a:avLst/>
-          </a:prstGeom>
-          <a:noFill/>
-        </p:spPr>
-        <p:txBody>
-          <a:bodyPr wrap="square" rtlCol="0">
-            <a:spAutoFit/>
-          </a:bodyPr>
-          <a:lstStyle/>
-          <a:p>
             <a:pPr algn="ctr"/>
             <a:r>
               <a:rPr lang="fr-FR" sz="2800" b="1" dirty="0">
                 <a:latin typeface="Candara" panose="020E0502030303020204" pitchFamily="34" charset="0"/>
               </a:rPr>
-              <a:t>A system </a:t>
+              <a:t>A </a:t>
+            </a:r>
+            <a:r>
+              <a:rPr lang="en-US" sz="2800" b="1" dirty="0">
+                <a:latin typeface="Candara" panose="020E0502030303020204" pitchFamily="34" charset="0"/>
+              </a:rPr>
+              <a:t>proven</a:t>
+            </a:r>
+            <a:r>
+              <a:rPr lang="fr-FR" sz="2800" b="1" dirty="0">
+                <a:latin typeface="Candara" panose="020E0502030303020204" pitchFamily="34" charset="0"/>
+              </a:rPr>
+              <a:t> Matching system </a:t>
             </a:r>
             <a:r>
               <a:rPr lang="fr-FR" sz="2800" b="1" dirty="0" err="1">
                 <a:latin typeface="Candara" panose="020E0502030303020204" pitchFamily="34" charset="0"/>
               </a:rPr>
-              <a:t>with</a:t>
+              <a:t>aiming</a:t>
+            </a:r>
+            <a:r>
+              <a:rPr lang="fr-FR" sz="2800" b="1" dirty="0">
+                <a:latin typeface="Candara" panose="020E0502030303020204" pitchFamily="34" charset="0"/>
+              </a:rPr>
+              <a:t> to </a:t>
+            </a:r>
+            <a:r>
+              <a:rPr lang="fr-FR" sz="2800" b="1" dirty="0" err="1">
+                <a:latin typeface="Candara" panose="020E0502030303020204" pitchFamily="34" charset="0"/>
+              </a:rPr>
+              <a:t>increase</a:t>
+            </a:r>
+            <a:r>
+              <a:rPr lang="fr-FR" sz="2800" b="1" dirty="0">
+                <a:latin typeface="Candara" panose="020E0502030303020204" pitchFamily="34" charset="0"/>
+              </a:rPr>
+              <a:t> satisfaction</a:t>
+            </a:r>
+            <a:br>
+              <a:rPr lang="fr-FR" sz="2800" b="1" dirty="0">
+                <a:latin typeface="Candara" panose="020E0502030303020204" pitchFamily="34" charset="0"/>
+              </a:rPr>
+            </a:br>
+            <a:r>
+              <a:rPr lang="fr-FR" sz="2800" b="1" dirty="0">
+                <a:latin typeface="Candara" panose="020E0502030303020204" pitchFamily="34" charset="0"/>
+              </a:rPr>
+              <a:t>and </a:t>
+            </a:r>
+            <a:r>
+              <a:rPr lang="fr-FR" sz="2800" b="1" dirty="0" err="1">
+                <a:latin typeface="Candara" panose="020E0502030303020204" pitchFamily="34" charset="0"/>
+              </a:rPr>
+              <a:t>better</a:t>
             </a:r>
             <a:r>
               <a:rPr lang="fr-FR" sz="2800" b="1" dirty="0">
@@ -41710,31 +41692,7 @@
               <a:rPr lang="fr-FR" sz="2800" b="1" dirty="0" err="1">
                 <a:latin typeface="Candara" panose="020E0502030303020204" pitchFamily="34" charset="0"/>
               </a:rPr>
-              <a:t>very</a:t>
-            </a:r>
-            <a:r>
-              <a:rPr lang="fr-FR" sz="2800" b="1" dirty="0">
-                <a:latin typeface="Candara" panose="020E0502030303020204" pitchFamily="34" charset="0"/>
-              </a:rPr>
-              <a:t> good </a:t>
-            </a:r>
-            <a:r>
-              <a:rPr lang="fr-FR" sz="2800" b="1" dirty="0" err="1">
-                <a:latin typeface="Candara" panose="020E0502030303020204" pitchFamily="34" charset="0"/>
-              </a:rPr>
-              <a:t>properties</a:t>
-            </a:r>
-            <a:r>
-              <a:rPr lang="fr-FR" sz="2800" b="1" dirty="0">
-                <a:latin typeface="Candara" panose="020E0502030303020204" pitchFamily="34" charset="0"/>
-              </a:rPr>
-              <a:t>, </a:t>
-            </a:r>
-            <a:r>
-              <a:rPr lang="fr-FR" sz="2800" b="1" dirty="0" err="1">
-                <a:latin typeface="Candara" panose="020E0502030303020204" pitchFamily="34" charset="0"/>
-              </a:rPr>
-              <a:t>while</a:t>
+              <a:t>allocate</a:t>
             </a:r>
             <a:r>
               <a:rPr lang="fr-FR" sz="2800" b="1" dirty="0">
@@ -41746,36 +41704,21 @@
               <a:rPr lang="fr-FR" sz="2800" b="1" dirty="0" err="1">
                 <a:latin typeface="Candara" panose="020E0502030303020204" pitchFamily="34" charset="0"/>
               </a:rPr>
-              <a:t>being</a:t>
+              <a:t>school</a:t>
             </a:r>
             <a:r>
               <a:rPr lang="fr-FR" sz="2800" b="1" dirty="0">
                 <a:latin typeface="Candara" panose="020E0502030303020204" pitchFamily="34" charset="0"/>
               </a:rPr>
-              <a:t> fast and </a:t>
-            </a:r>
-            <a:r>
-              <a:rPr lang="fr-FR" sz="2800" b="1" dirty="0" err="1">
-                <a:latin typeface="Candara" panose="020E0502030303020204" pitchFamily="34" charset="0"/>
-              </a:rPr>
-              <a:t>with</a:t>
-            </a:r>
-            <a:r>
-              <a:rPr lang="fr-FR" sz="2800" b="1" dirty="0">
-                <a:latin typeface="Candara" panose="020E0502030303020204" pitchFamily="34" charset="0"/>
-              </a:rPr>
-              <a:t> no congestion  </a:t>
-            </a:r>
-            <a:endParaRPr lang="en-US" sz="2800" b="1" dirty="0">
-              <a:latin typeface="Candara" panose="020E0502030303020204" pitchFamily="34" charset="0"/>
-            </a:endParaRPr>
+              <a:t> ressources</a:t>
+            </a:r>
           </a:p>
         </p:txBody>
       </p:sp>
     </p:spTree>
     <p:extLst>
       <p:ext uri="{BB962C8B-B14F-4D97-AF65-F5344CB8AC3E}">
-        <p14:creationId xmlns:p14="http://schemas.microsoft.com/office/powerpoint/2010/main" val="3797878874"/>
+        <p14:creationId xmlns:p14="http://schemas.microsoft.com/office/powerpoint/2010/main" val="1864240373"/>
       </p:ext>
     </p:extLst>
   </p:cSld>
@@ -41807,7 +41750,7 @@
           <p:cNvPr id="2" name="Title 1">
             <a:extLst>
               <a:ext uri="{FF2B5EF4-FFF2-40B4-BE49-F238E27FC236}">
-                <a16:creationId xmlns:a16="http://schemas.microsoft.com/office/drawing/2014/main" id="{CCD8C1BE-1835-4197-D93B-0314B44CEF86}"/>
+                <a16:creationId xmlns:a16="http://schemas.microsoft.com/office/drawing/2014/main" id="{08ED9F9B-9F3E-B88D-CE67-4407710620A0}"/>
               </a:ext>
             </a:extLst>
           </p:cNvPr>
@@ -41826,462 +41769,60 @@
           <a:lstStyle/>
           <a:p>
             <a:r>
-              <a:rPr lang="fr-FR" sz="3200" dirty="0" err="1">
+              <a:rPr lang="fr-FR" sz="3600" dirty="0">
                 <a:latin typeface="Candara" panose="020E0502030303020204" pitchFamily="34" charset="0"/>
               </a:rPr>
-              <a:t>Other</a:t>
-            </a:r>
-            <a:r>
-              <a:rPr lang="fr-FR" sz="3200" dirty="0">
+              <a:t>CASTLE </a:t>
+            </a:r>
+            <a:r>
+              <a:rPr lang="fr-FR" sz="3600" dirty="0" err="1">
                 <a:latin typeface="Candara" panose="020E0502030303020204" pitchFamily="34" charset="0"/>
               </a:rPr>
-              <a:t> </a:t>
-            </a:r>
-            <a:r>
-              <a:rPr lang="fr-FR" sz="3200" dirty="0" err="1">
-                <a:latin typeface="Candara" panose="020E0502030303020204" pitchFamily="34" charset="0"/>
-              </a:rPr>
-              <a:t>Considerations</a:t>
-            </a:r>
-            <a:endParaRPr lang="en-US" sz="3200" dirty="0">
+              <a:t>Properties</a:t>
+            </a:r>
+            <a:endParaRPr lang="en-US" sz="3600" dirty="0">
               <a:latin typeface="Candara" panose="020E0502030303020204" pitchFamily="34" charset="0"/>
             </a:endParaRPr>
           </a:p>
         </p:txBody>
       </p:sp>
-      <p:sp>
-        <p:nvSpPr>
-          <p:cNvPr id="3" name="Content Placeholder 2">
-            <a:extLst>
-              <a:ext uri="{FF2B5EF4-FFF2-40B4-BE49-F238E27FC236}">
-                <a16:creationId xmlns:a16="http://schemas.microsoft.com/office/drawing/2014/main" id="{DC8B2311-A707-180F-13E9-DC3071D0FC8F}"/>
-              </a:ext>
-            </a:extLst>
-          </p:cNvPr>
-          <p:cNvSpPr>
-            <a:spLocks noGrp="1"/>
-          </p:cNvSpPr>
+      <p:graphicFrame>
+        <p:nvGraphicFramePr>
+          <p:cNvPr id="4" name="Content Placeholder 3">
+            <a:extLst>
+              <a:ext uri="{FF2B5EF4-FFF2-40B4-BE49-F238E27FC236}">
+                <a16:creationId xmlns:a16="http://schemas.microsoft.com/office/drawing/2014/main" id="{5D8F7802-D5C6-D0B5-5CAD-45A8B4824B82}"/>
+              </a:ext>
+            </a:extLst>
+          </p:cNvPr>
+          <p:cNvGraphicFramePr>
+            <a:graphicFrameLocks noGrp="1"/>
+          </p:cNvGraphicFramePr>
           <p:nvPr>
             <p:ph idx="1"/>
+            <p:extLst>
+              <p:ext uri="{D42A27DB-BD31-4B8C-83A1-F6EECF244321}">
+                <p14:modId xmlns:p14="http://schemas.microsoft.com/office/powerpoint/2010/main" val="2785674918"/>
+              </p:ext>
+            </p:extLst>
           </p:nvPr>
-        </p:nvSpPr>
-        <p:spPr>
-          <a:xfrm>
-            <a:off x="685800" y="1902877"/>
-            <a:ext cx="10820400" cy="3443823"/>
-          </a:xfrm>
-        </p:spPr>
-        <p:txBody>
-          <a:bodyPr/>
-          <a:lstStyle/>
-          <a:p>
-            <a:pPr>
-              <a:lnSpc>
-                <a:spcPct val="200000"/>
-              </a:lnSpc>
-            </a:pPr>
-            <a:r>
-              <a:rPr lang="fr-FR" dirty="0" err="1">
-                <a:latin typeface="Candara" panose="020E0502030303020204" pitchFamily="34" charset="0"/>
-              </a:rPr>
-              <a:t>Improve</a:t>
-            </a:r>
-            <a:r>
-              <a:rPr lang="fr-FR" dirty="0">
-                <a:latin typeface="Candara" panose="020E0502030303020204" pitchFamily="34" charset="0"/>
-              </a:rPr>
-              <a:t> </a:t>
-            </a:r>
-            <a:r>
-              <a:rPr lang="fr-FR" b="1" dirty="0" err="1">
-                <a:latin typeface="Candara" panose="020E0502030303020204" pitchFamily="34" charset="0"/>
-              </a:rPr>
-              <a:t>fairness</a:t>
-            </a:r>
-            <a:r>
-              <a:rPr lang="fr-FR" dirty="0">
-                <a:latin typeface="Candara" panose="020E0502030303020204" pitchFamily="34" charset="0"/>
-              </a:rPr>
-              <a:t> : </a:t>
-            </a:r>
-            <a:r>
-              <a:rPr lang="fr-FR" dirty="0" err="1">
-                <a:latin typeface="Candara" panose="020E0502030303020204" pitchFamily="34" charset="0"/>
-              </a:rPr>
-              <a:t>low</a:t>
-            </a:r>
-            <a:r>
-              <a:rPr lang="fr-FR" dirty="0">
-                <a:latin typeface="Candara" panose="020E0502030303020204" pitchFamily="34" charset="0"/>
-              </a:rPr>
-              <a:t> </a:t>
-            </a:r>
-            <a:r>
-              <a:rPr lang="fr-FR" dirty="0" err="1">
-                <a:latin typeface="Candara" panose="020E0502030303020204" pitchFamily="34" charset="0"/>
-              </a:rPr>
-              <a:t>rank</a:t>
-            </a:r>
-            <a:r>
-              <a:rPr lang="fr-FR" dirty="0">
-                <a:latin typeface="Candara" panose="020E0502030303020204" pitchFamily="34" charset="0"/>
-              </a:rPr>
-              <a:t> </a:t>
-            </a:r>
-            <a:r>
-              <a:rPr lang="fr-FR" dirty="0">
-                <a:latin typeface="Candara" panose="020E0502030303020204" pitchFamily="34" charset="0"/>
-                <a:sym typeface="Wingdings" panose="05000000000000000000" pitchFamily="2" charset="2"/>
-              </a:rPr>
-              <a:t> boost </a:t>
-            </a:r>
-            <a:r>
-              <a:rPr lang="fr-FR" dirty="0" err="1">
-                <a:latin typeface="Candara" panose="020E0502030303020204" pitchFamily="34" charset="0"/>
-                <a:sym typeface="Wingdings" panose="05000000000000000000" pitchFamily="2" charset="2"/>
-              </a:rPr>
-              <a:t>next</a:t>
-            </a:r>
-            <a:r>
-              <a:rPr lang="fr-FR" dirty="0">
-                <a:latin typeface="Candara" panose="020E0502030303020204" pitchFamily="34" charset="0"/>
-                <a:sym typeface="Wingdings" panose="05000000000000000000" pitchFamily="2" charset="2"/>
-              </a:rPr>
-              <a:t> time  (loose </a:t>
-            </a:r>
-            <a:r>
-              <a:rPr lang="fr-FR" dirty="0" err="1">
-                <a:latin typeface="Candara" panose="020E0502030303020204" pitchFamily="34" charset="0"/>
-                <a:sym typeface="Wingdings" panose="05000000000000000000" pitchFamily="2" charset="2"/>
-              </a:rPr>
-              <a:t>strategy</a:t>
-            </a:r>
-            <a:r>
-              <a:rPr lang="fr-FR" dirty="0">
-                <a:latin typeface="Candara" panose="020E0502030303020204" pitchFamily="34" charset="0"/>
-                <a:sym typeface="Wingdings" panose="05000000000000000000" pitchFamily="2" charset="2"/>
-              </a:rPr>
-              <a:t> </a:t>
-            </a:r>
-            <a:r>
-              <a:rPr lang="fr-FR" dirty="0" err="1">
-                <a:latin typeface="Candara" panose="020E0502030303020204" pitchFamily="34" charset="0"/>
-                <a:sym typeface="Wingdings" panose="05000000000000000000" pitchFamily="2" charset="2"/>
-              </a:rPr>
-              <a:t>proofness</a:t>
-            </a:r>
-            <a:r>
-              <a:rPr lang="fr-FR" dirty="0">
-                <a:latin typeface="Candara" panose="020E0502030303020204" pitchFamily="34" charset="0"/>
-                <a:sym typeface="Wingdings" panose="05000000000000000000" pitchFamily="2" charset="2"/>
-              </a:rPr>
-              <a:t>)</a:t>
-            </a:r>
-          </a:p>
-          <a:p>
-            <a:pPr>
-              <a:lnSpc>
-                <a:spcPct val="200000"/>
-              </a:lnSpc>
-            </a:pPr>
-            <a:r>
-              <a:rPr lang="fr-FR" b="1" dirty="0">
-                <a:latin typeface="Candara" panose="020E0502030303020204" pitchFamily="34" charset="0"/>
-                <a:sym typeface="Wingdings" panose="05000000000000000000" pitchFamily="2" charset="2"/>
-              </a:rPr>
-              <a:t>Equipment</a:t>
-            </a:r>
-            <a:r>
-              <a:rPr lang="fr-FR" dirty="0">
-                <a:latin typeface="Candara" panose="020E0502030303020204" pitchFamily="34" charset="0"/>
-                <a:sym typeface="Wingdings" panose="05000000000000000000" pitchFamily="2" charset="2"/>
-              </a:rPr>
-              <a:t> </a:t>
-            </a:r>
-            <a:r>
-              <a:rPr lang="fr-FR" dirty="0" err="1">
-                <a:latin typeface="Candara" panose="020E0502030303020204" pitchFamily="34" charset="0"/>
-                <a:sym typeface="Wingdings" panose="05000000000000000000" pitchFamily="2" charset="2"/>
-              </a:rPr>
-              <a:t>matching</a:t>
-            </a:r>
-            <a:r>
-              <a:rPr lang="fr-FR" dirty="0">
-                <a:latin typeface="Candara" panose="020E0502030303020204" pitchFamily="34" charset="0"/>
-                <a:sym typeface="Wingdings" panose="05000000000000000000" pitchFamily="2" charset="2"/>
-              </a:rPr>
-              <a:t> (loose </a:t>
-            </a:r>
-            <a:r>
-              <a:rPr lang="fr-FR" dirty="0" err="1">
-                <a:latin typeface="Candara" panose="020E0502030303020204" pitchFamily="34" charset="0"/>
-                <a:sym typeface="Wingdings" panose="05000000000000000000" pitchFamily="2" charset="2"/>
-              </a:rPr>
-              <a:t>strategy-proofness</a:t>
-            </a:r>
-            <a:r>
-              <a:rPr lang="fr-FR" dirty="0">
-                <a:latin typeface="Candara" panose="020E0502030303020204" pitchFamily="34" charset="0"/>
-                <a:sym typeface="Wingdings" panose="05000000000000000000" pitchFamily="2" charset="2"/>
-              </a:rPr>
-              <a:t>, and more </a:t>
-            </a:r>
-            <a:r>
-              <a:rPr lang="fr-FR" dirty="0" err="1">
-                <a:latin typeface="Candara" panose="020E0502030303020204" pitchFamily="34" charset="0"/>
-                <a:sym typeface="Wingdings" panose="05000000000000000000" pitchFamily="2" charset="2"/>
-              </a:rPr>
-              <a:t>unmatched</a:t>
-            </a:r>
-            <a:r>
-              <a:rPr lang="fr-FR" dirty="0">
-                <a:latin typeface="Candara" panose="020E0502030303020204" pitchFamily="34" charset="0"/>
-                <a:sym typeface="Wingdings" panose="05000000000000000000" pitchFamily="2" charset="2"/>
-              </a:rPr>
-              <a:t> courses)</a:t>
-            </a:r>
-          </a:p>
-          <a:p>
-            <a:pPr>
-              <a:lnSpc>
-                <a:spcPct val="200000"/>
-              </a:lnSpc>
-            </a:pPr>
-            <a:r>
-              <a:rPr lang="fr-FR" b="1" dirty="0" err="1">
-                <a:latin typeface="Candara" panose="020E0502030303020204" pitchFamily="34" charset="0"/>
-                <a:sym typeface="Wingdings" panose="05000000000000000000" pitchFamily="2" charset="2"/>
-              </a:rPr>
-              <a:t>Proximity</a:t>
-            </a:r>
-            <a:r>
-              <a:rPr lang="fr-FR" dirty="0">
-                <a:latin typeface="Candara" panose="020E0502030303020204" pitchFamily="34" charset="0"/>
-                <a:sym typeface="Wingdings" panose="05000000000000000000" pitchFamily="2" charset="2"/>
-              </a:rPr>
-              <a:t> to </a:t>
-            </a:r>
-            <a:r>
-              <a:rPr lang="fr-FR" dirty="0" err="1">
-                <a:latin typeface="Candara" panose="020E0502030303020204" pitchFamily="34" charset="0"/>
-                <a:sym typeface="Wingdings" panose="05000000000000000000" pitchFamily="2" charset="2"/>
-              </a:rPr>
-              <a:t>labs</a:t>
-            </a:r>
-            <a:r>
-              <a:rPr lang="fr-FR" dirty="0">
-                <a:latin typeface="Candara" panose="020E0502030303020204" pitchFamily="34" charset="0"/>
-                <a:sym typeface="Wingdings" panose="05000000000000000000" pitchFamily="2" charset="2"/>
-              </a:rPr>
-              <a:t>/</a:t>
-            </a:r>
-            <a:r>
-              <a:rPr lang="fr-FR" dirty="0" err="1">
-                <a:latin typeface="Candara" panose="020E0502030303020204" pitchFamily="34" charset="0"/>
-                <a:sym typeface="Wingdings" panose="05000000000000000000" pitchFamily="2" charset="2"/>
-              </a:rPr>
-              <a:t>dorms</a:t>
-            </a:r>
-            <a:r>
-              <a:rPr lang="fr-FR" dirty="0">
-                <a:latin typeface="Candara" panose="020E0502030303020204" pitchFamily="34" charset="0"/>
-                <a:sym typeface="Wingdings" panose="05000000000000000000" pitchFamily="2" charset="2"/>
-              </a:rPr>
-              <a:t> (</a:t>
-            </a:r>
-            <a:r>
-              <a:rPr lang="fr-FR" dirty="0" err="1">
-                <a:latin typeface="Candara" panose="020E0502030303020204" pitchFamily="34" charset="0"/>
-                <a:sym typeface="Wingdings" panose="05000000000000000000" pitchFamily="2" charset="2"/>
-              </a:rPr>
-              <a:t>makes</a:t>
-            </a:r>
-            <a:r>
-              <a:rPr lang="fr-FR" dirty="0">
-                <a:latin typeface="Candara" panose="020E0502030303020204" pitchFamily="34" charset="0"/>
-                <a:sym typeface="Wingdings" panose="05000000000000000000" pitchFamily="2" charset="2"/>
-              </a:rPr>
-              <a:t> </a:t>
-            </a:r>
-            <a:r>
-              <a:rPr lang="fr-FR" dirty="0" err="1">
-                <a:latin typeface="Candara" panose="020E0502030303020204" pitchFamily="34" charset="0"/>
-                <a:sym typeface="Wingdings" panose="05000000000000000000" pitchFamily="2" charset="2"/>
-              </a:rPr>
-              <a:t>stability</a:t>
-            </a:r>
-            <a:r>
-              <a:rPr lang="fr-FR" dirty="0">
-                <a:latin typeface="Candara" panose="020E0502030303020204" pitchFamily="34" charset="0"/>
-                <a:sym typeface="Wingdings" panose="05000000000000000000" pitchFamily="2" charset="2"/>
-              </a:rPr>
-              <a:t> harder, </a:t>
-            </a:r>
-            <a:r>
-              <a:rPr lang="fr-FR" dirty="0" err="1">
-                <a:latin typeface="Candara" panose="020E0502030303020204" pitchFamily="34" charset="0"/>
-                <a:sym typeface="Wingdings" panose="05000000000000000000" pitchFamily="2" charset="2"/>
-              </a:rPr>
-              <a:t>improves</a:t>
-            </a:r>
-            <a:r>
-              <a:rPr lang="fr-FR" dirty="0">
-                <a:latin typeface="Candara" panose="020E0502030303020204" pitchFamily="34" charset="0"/>
-                <a:sym typeface="Wingdings" panose="05000000000000000000" pitchFamily="2" charset="2"/>
-              </a:rPr>
-              <a:t> </a:t>
-            </a:r>
-            <a:r>
-              <a:rPr lang="fr-FR" dirty="0" err="1">
-                <a:latin typeface="Candara" panose="020E0502030303020204" pitchFamily="34" charset="0"/>
-                <a:sym typeface="Wingdings" panose="05000000000000000000" pitchFamily="2" charset="2"/>
-              </a:rPr>
-              <a:t>practical</a:t>
-            </a:r>
-            <a:r>
-              <a:rPr lang="fr-FR" dirty="0">
-                <a:latin typeface="Candara" panose="020E0502030303020204" pitchFamily="34" charset="0"/>
-                <a:sym typeface="Wingdings" panose="05000000000000000000" pitchFamily="2" charset="2"/>
-              </a:rPr>
-              <a:t> </a:t>
-            </a:r>
-            <a:r>
-              <a:rPr lang="fr-FR" dirty="0" err="1">
-                <a:latin typeface="Candara" panose="020E0502030303020204" pitchFamily="34" charset="0"/>
-                <a:sym typeface="Wingdings" panose="05000000000000000000" pitchFamily="2" charset="2"/>
-              </a:rPr>
-              <a:t>usability</a:t>
-            </a:r>
-            <a:r>
-              <a:rPr lang="fr-FR" dirty="0">
-                <a:latin typeface="Candara" panose="020E0502030303020204" pitchFamily="34" charset="0"/>
-                <a:sym typeface="Wingdings" panose="05000000000000000000" pitchFamily="2" charset="2"/>
-              </a:rPr>
-              <a:t>)</a:t>
-            </a:r>
-          </a:p>
-          <a:p>
-            <a:pPr>
-              <a:lnSpc>
-                <a:spcPct val="200000"/>
-              </a:lnSpc>
-            </a:pPr>
-            <a:r>
-              <a:rPr lang="fr-FR" b="1" dirty="0" err="1">
-                <a:latin typeface="Candara" panose="020E0502030303020204" pitchFamily="34" charset="0"/>
-                <a:sym typeface="Wingdings" panose="05000000000000000000" pitchFamily="2" charset="2"/>
-              </a:rPr>
-              <a:t>Include</a:t>
-            </a:r>
-            <a:r>
-              <a:rPr lang="fr-FR" dirty="0">
-                <a:latin typeface="Candara" panose="020E0502030303020204" pitchFamily="34" charset="0"/>
-                <a:sym typeface="Wingdings" panose="05000000000000000000" pitchFamily="2" charset="2"/>
-              </a:rPr>
-              <a:t> </a:t>
-            </a:r>
-            <a:r>
-              <a:rPr lang="fr-FR" dirty="0" err="1">
-                <a:latin typeface="Candara" panose="020E0502030303020204" pitchFamily="34" charset="0"/>
-                <a:sym typeface="Wingdings" panose="05000000000000000000" pitchFamily="2" charset="2"/>
-              </a:rPr>
-              <a:t>timetable</a:t>
-            </a:r>
-            <a:r>
-              <a:rPr lang="fr-FR" dirty="0">
-                <a:latin typeface="Candara" panose="020E0502030303020204" pitchFamily="34" charset="0"/>
-                <a:sym typeface="Wingdings" panose="05000000000000000000" pitchFamily="2" charset="2"/>
-              </a:rPr>
-              <a:t> management (</a:t>
-            </a:r>
-            <a:r>
-              <a:rPr lang="fr-FR" dirty="0" err="1">
-                <a:latin typeface="Candara" panose="020E0502030303020204" pitchFamily="34" charset="0"/>
-                <a:sym typeface="Wingdings" panose="05000000000000000000" pitchFamily="2" charset="2"/>
-              </a:rPr>
-              <a:t>makes</a:t>
-            </a:r>
-            <a:r>
-              <a:rPr lang="fr-FR" dirty="0">
-                <a:latin typeface="Candara" panose="020E0502030303020204" pitchFamily="34" charset="0"/>
-                <a:sym typeface="Wingdings" panose="05000000000000000000" pitchFamily="2" charset="2"/>
-              </a:rPr>
-              <a:t> </a:t>
-            </a:r>
-            <a:r>
-              <a:rPr lang="fr-FR" dirty="0" err="1">
-                <a:latin typeface="Candara" panose="020E0502030303020204" pitchFamily="34" charset="0"/>
-                <a:sym typeface="Wingdings" panose="05000000000000000000" pitchFamily="2" charset="2"/>
-              </a:rPr>
-              <a:t>it</a:t>
-            </a:r>
-            <a:r>
-              <a:rPr lang="fr-FR" dirty="0">
-                <a:latin typeface="Candara" panose="020E0502030303020204" pitchFamily="34" charset="0"/>
-                <a:sym typeface="Wingdings" panose="05000000000000000000" pitchFamily="2" charset="2"/>
-              </a:rPr>
-              <a:t> </a:t>
-            </a:r>
-            <a:r>
-              <a:rPr lang="fr-FR" dirty="0" err="1">
-                <a:latin typeface="Candara" panose="020E0502030303020204" pitchFamily="34" charset="0"/>
-                <a:sym typeface="Wingdings" panose="05000000000000000000" pitchFamily="2" charset="2"/>
-              </a:rPr>
-              <a:t>much</a:t>
-            </a:r>
-            <a:r>
-              <a:rPr lang="fr-FR" dirty="0">
-                <a:latin typeface="Candara" panose="020E0502030303020204" pitchFamily="34" charset="0"/>
-                <a:sym typeface="Wingdings" panose="05000000000000000000" pitchFamily="2" charset="2"/>
-              </a:rPr>
-              <a:t> more </a:t>
-            </a:r>
-            <a:r>
-              <a:rPr lang="fr-FR" dirty="0" err="1">
-                <a:latin typeface="Candara" panose="020E0502030303020204" pitchFamily="34" charset="0"/>
-                <a:sym typeface="Wingdings" panose="05000000000000000000" pitchFamily="2" charset="2"/>
-              </a:rPr>
-              <a:t>complex</a:t>
-            </a:r>
-            <a:r>
-              <a:rPr lang="fr-FR" dirty="0">
-                <a:latin typeface="Candara" panose="020E0502030303020204" pitchFamily="34" charset="0"/>
-                <a:sym typeface="Wingdings" panose="05000000000000000000" pitchFamily="2" charset="2"/>
-              </a:rPr>
-              <a:t>)</a:t>
-            </a:r>
-          </a:p>
-          <a:p>
-            <a:endParaRPr lang="fr-FR" dirty="0">
-              <a:latin typeface="Candara" panose="020E0502030303020204" pitchFamily="34" charset="0"/>
-              <a:sym typeface="Wingdings" panose="05000000000000000000" pitchFamily="2" charset="2"/>
-            </a:endParaRPr>
-          </a:p>
-          <a:p>
-            <a:endParaRPr lang="fr-FR" dirty="0">
-              <a:latin typeface="Candara" panose="020E0502030303020204" pitchFamily="34" charset="0"/>
-              <a:sym typeface="Wingdings" panose="05000000000000000000" pitchFamily="2" charset="2"/>
-            </a:endParaRPr>
-          </a:p>
-          <a:p>
-            <a:endParaRPr lang="fr-FR" dirty="0">
-              <a:latin typeface="Candara" panose="020E0502030303020204" pitchFamily="34" charset="0"/>
-              <a:sym typeface="Wingdings" panose="05000000000000000000" pitchFamily="2" charset="2"/>
-            </a:endParaRPr>
-          </a:p>
-          <a:p>
-            <a:endParaRPr lang="en-US" dirty="0">
-              <a:latin typeface="Candara" panose="020E0502030303020204" pitchFamily="34" charset="0"/>
-            </a:endParaRPr>
-          </a:p>
-        </p:txBody>
-      </p:sp>
-      <p:sp>
-        <p:nvSpPr>
-          <p:cNvPr id="4" name="TextBox 3">
-            <a:extLst>
-              <a:ext uri="{FF2B5EF4-FFF2-40B4-BE49-F238E27FC236}">
-                <a16:creationId xmlns:a16="http://schemas.microsoft.com/office/drawing/2014/main" id="{B82C1A50-81DB-E5A9-BFF5-97B1039D748D}"/>
+        </p:nvGraphicFramePr>
+        <p:xfrm>
+          <a:off x="3196590" y="1467326"/>
+          <a:ext cx="5798820" cy="3923347"/>
+        </p:xfrm>
+        <a:graphic>
+          <a:graphicData uri="http://schemas.openxmlformats.org/drawingml/2006/diagram">
+            <dgm:relIds xmlns:dgm="http://schemas.openxmlformats.org/drawingml/2006/diagram" xmlns:r="http://schemas.openxmlformats.org/officeDocument/2006/relationships" r:dm="rId2" r:lo="rId3" r:qs="rId4" r:cs="rId5"/>
+          </a:graphicData>
+        </a:graphic>
+      </p:graphicFrame>
+      <p:sp>
+        <p:nvSpPr>
+          <p:cNvPr id="5" name="TextBox 4">
+            <a:extLst>
+              <a:ext uri="{FF2B5EF4-FFF2-40B4-BE49-F238E27FC236}">
+                <a16:creationId xmlns:a16="http://schemas.microsoft.com/office/drawing/2014/main" id="{EF0FBE8D-AB27-AA4E-7DAF-610BC10EFD1E}"/>
               </a:ext>
             </a:extLst>
           </p:cNvPr>
@@ -42290,8 +41831,8 @@
         </p:nvSpPr>
         <p:spPr>
           <a:xfrm>
-            <a:off x="1552575" y="5692224"/>
-            <a:ext cx="9290050" cy="523220"/>
+            <a:off x="7894320" y="2147583"/>
+            <a:ext cx="3362960" cy="707886"/>
           </a:xfrm>
           <a:prstGeom prst="rect">
             <a:avLst/>
@@ -42304,62 +41845,354 @@
           </a:bodyPr>
           <a:lstStyle/>
           <a:p>
-            <a:pPr algn="ctr"/>
-            <a:r>
-              <a:rPr lang="fr-FR" sz="2800" dirty="0">
+            <a:pPr marL="285750" indent="-285750">
+              <a:buFontTx/>
+              <a:buChar char="-"/>
+            </a:pPr>
+            <a:r>
+              <a:rPr lang="en-US" sz="2000" dirty="0">
+                <a:effectLst/>
+                <a:latin typeface="Candara" panose="020E0502030303020204" pitchFamily="34" charset="0"/>
+                <a:ea typeface="Aptos" panose="020B0004020202020204" pitchFamily="34" charset="0"/>
+                <a:cs typeface="Times New Roman" panose="02020603050405020304" pitchFamily="18" charset="0"/>
+              </a:rPr>
+              <a:t>Professor proposing DA makes it optimal</a:t>
+            </a:r>
+            <a:endParaRPr lang="en-US" sz="2000" dirty="0">
+              <a:latin typeface="Candara" panose="020E0502030303020204" pitchFamily="34" charset="0"/>
+            </a:endParaRPr>
+          </a:p>
+        </p:txBody>
+      </p:sp>
+      <p:sp>
+        <p:nvSpPr>
+          <p:cNvPr id="6" name="TextBox 5">
+            <a:extLst>
+              <a:ext uri="{FF2B5EF4-FFF2-40B4-BE49-F238E27FC236}">
+                <a16:creationId xmlns:a16="http://schemas.microsoft.com/office/drawing/2014/main" id="{9FBDF5EF-FE02-A954-2BAC-B9B1E6409528}"/>
+              </a:ext>
+            </a:extLst>
+          </p:cNvPr>
+          <p:cNvSpPr txBox="1"/>
+          <p:nvPr/>
+        </p:nvSpPr>
+        <p:spPr>
+          <a:xfrm>
+            <a:off x="1142538" y="2147583"/>
+            <a:ext cx="3362960" cy="707886"/>
+          </a:xfrm>
+          <a:prstGeom prst="rect">
+            <a:avLst/>
+          </a:prstGeom>
+          <a:noFill/>
+        </p:spPr>
+        <p:txBody>
+          <a:bodyPr wrap="square" rtlCol="0">
+            <a:spAutoFit/>
+          </a:bodyPr>
+          <a:lstStyle/>
+          <a:p>
+            <a:pPr marL="285750" indent="-285750">
+              <a:buFontTx/>
+              <a:buChar char="-"/>
+            </a:pPr>
+            <a:r>
+              <a:rPr lang="fr-FR" sz="2000" dirty="0">
                 <a:latin typeface="Candara" panose="020E0502030303020204" pitchFamily="34" charset="0"/>
               </a:rPr>
-              <a:t>The System can </a:t>
-            </a:r>
-            <a:r>
-              <a:rPr lang="fr-FR" sz="2800" dirty="0" err="1">
+              <a:t>Strict </a:t>
+            </a:r>
+            <a:r>
+              <a:rPr lang="fr-FR" sz="2000" dirty="0" err="1">
                 <a:latin typeface="Candara" panose="020E0502030303020204" pitchFamily="34" charset="0"/>
               </a:rPr>
-              <a:t>be</a:t>
-            </a:r>
-            <a:r>
-              <a:rPr lang="fr-FR" sz="2800" dirty="0">
+              <a:t>preferences</a:t>
+            </a:r>
+            <a:r>
+              <a:rPr lang="fr-FR" sz="2000" dirty="0">
+                <a:latin typeface="Candara" panose="020E0502030303020204" pitchFamily="34" charset="0"/>
+              </a:rPr>
+              <a:t> of </a:t>
+            </a:r>
+            <a:r>
+              <a:rPr lang="fr-FR" sz="2000" dirty="0" err="1">
+                <a:latin typeface="Candara" panose="020E0502030303020204" pitchFamily="34" charset="0"/>
+              </a:rPr>
+              <a:t>Rooms</a:t>
+            </a:r>
+            <a:r>
+              <a:rPr lang="fr-FR" sz="2000" dirty="0">
+                <a:latin typeface="Candara" panose="020E0502030303020204" pitchFamily="34" charset="0"/>
+              </a:rPr>
+              <a:t> and </a:t>
+            </a:r>
+            <a:r>
+              <a:rPr lang="fr-FR" sz="2000" dirty="0" err="1">
+                <a:latin typeface="Candara" panose="020E0502030303020204" pitchFamily="34" charset="0"/>
+              </a:rPr>
+              <a:t>Professors</a:t>
+            </a:r>
+            <a:endParaRPr lang="en-US" sz="2000" dirty="0">
+              <a:latin typeface="Candara" panose="020E0502030303020204" pitchFamily="34" charset="0"/>
+            </a:endParaRPr>
+          </a:p>
+        </p:txBody>
+      </p:sp>
+      <p:sp>
+        <p:nvSpPr>
+          <p:cNvPr id="7" name="TextBox 6">
+            <a:extLst>
+              <a:ext uri="{FF2B5EF4-FFF2-40B4-BE49-F238E27FC236}">
+                <a16:creationId xmlns:a16="http://schemas.microsoft.com/office/drawing/2014/main" id="{6E59BCDA-0AD2-815D-3E17-ADB3F069E74A}"/>
+              </a:ext>
+            </a:extLst>
+          </p:cNvPr>
+          <p:cNvSpPr txBox="1"/>
+          <p:nvPr/>
+        </p:nvSpPr>
+        <p:spPr>
+          <a:xfrm>
+            <a:off x="1142538" y="4003289"/>
+            <a:ext cx="3362960" cy="707886"/>
+          </a:xfrm>
+          <a:prstGeom prst="rect">
+            <a:avLst/>
+          </a:prstGeom>
+          <a:noFill/>
+        </p:spPr>
+        <p:txBody>
+          <a:bodyPr wrap="square" rtlCol="0">
+            <a:spAutoFit/>
+          </a:bodyPr>
+          <a:lstStyle/>
+          <a:p>
+            <a:pPr marL="285750" indent="-285750">
+              <a:buFontTx/>
+              <a:buChar char="-"/>
+            </a:pPr>
+            <a:r>
+              <a:rPr lang="fr-FR" sz="2000" dirty="0">
+                <a:latin typeface="Candara" panose="020E0502030303020204" pitchFamily="34" charset="0"/>
+              </a:rPr>
+              <a:t>Single, </a:t>
+            </a:r>
+            <a:r>
+              <a:rPr lang="fr-FR" sz="2000" dirty="0" err="1">
+                <a:latin typeface="Candara" panose="020E0502030303020204" pitchFamily="34" charset="0"/>
+              </a:rPr>
+              <a:t>confidential</a:t>
+            </a:r>
+            <a:r>
+              <a:rPr lang="fr-FR" sz="2000" dirty="0">
+                <a:latin typeface="Candara" panose="020E0502030303020204" pitchFamily="34" charset="0"/>
+              </a:rPr>
+              <a:t> and Central </a:t>
+            </a:r>
+            <a:r>
+              <a:rPr lang="fr-FR" sz="2000" dirty="0" err="1">
+                <a:latin typeface="Candara" panose="020E0502030303020204" pitchFamily="34" charset="0"/>
+              </a:rPr>
+              <a:t>Clearinghouse</a:t>
+            </a:r>
+            <a:endParaRPr lang="en-US" sz="2000" dirty="0">
+              <a:latin typeface="Candara" panose="020E0502030303020204" pitchFamily="34" charset="0"/>
+            </a:endParaRPr>
+          </a:p>
+        </p:txBody>
+      </p:sp>
+      <p:sp>
+        <p:nvSpPr>
+          <p:cNvPr id="8" name="TextBox 7">
+            <a:extLst>
+              <a:ext uri="{FF2B5EF4-FFF2-40B4-BE49-F238E27FC236}">
+                <a16:creationId xmlns:a16="http://schemas.microsoft.com/office/drawing/2014/main" id="{1DAFCE42-9D4D-AFCA-5A7D-1A73485F43B3}"/>
+              </a:ext>
+            </a:extLst>
+          </p:cNvPr>
+          <p:cNvSpPr txBox="1"/>
+          <p:nvPr/>
+        </p:nvSpPr>
+        <p:spPr>
+          <a:xfrm>
+            <a:off x="7894320" y="4003290"/>
+            <a:ext cx="3362960" cy="707886"/>
+          </a:xfrm>
+          <a:prstGeom prst="rect">
+            <a:avLst/>
+          </a:prstGeom>
+          <a:noFill/>
+        </p:spPr>
+        <p:txBody>
+          <a:bodyPr wrap="square" rtlCol="0">
+            <a:spAutoFit/>
+          </a:bodyPr>
+          <a:lstStyle/>
+          <a:p>
+            <a:pPr marL="285750" indent="-285750">
+              <a:buFontTx/>
+              <a:buChar char="-"/>
+            </a:pPr>
+            <a:r>
+              <a:rPr lang="fr-FR" sz="2000" dirty="0">
+                <a:latin typeface="Candara" panose="020E0502030303020204" pitchFamily="34" charset="0"/>
+              </a:rPr>
+              <a:t>Professor </a:t>
+            </a:r>
+            <a:r>
+              <a:rPr lang="fr-FR" sz="2000" dirty="0" err="1">
+                <a:latin typeface="Candara" panose="020E0502030303020204" pitchFamily="34" charset="0"/>
+              </a:rPr>
+              <a:t>proposing</a:t>
+            </a:r>
+            <a:r>
+              <a:rPr lang="fr-FR" sz="2000" dirty="0">
+                <a:latin typeface="Candara" panose="020E0502030303020204" pitchFamily="34" charset="0"/>
+              </a:rPr>
+              <a:t> and </a:t>
+            </a:r>
+            <a:r>
+              <a:rPr lang="fr-FR" sz="2000" dirty="0" err="1">
+                <a:latin typeface="Candara" panose="020E0502030303020204" pitchFamily="34" charset="0"/>
+              </a:rPr>
+              <a:t>fixed</a:t>
+            </a:r>
+            <a:r>
+              <a:rPr lang="fr-FR" sz="2000" dirty="0">
                 <a:latin typeface="Candara" panose="020E0502030303020204" pitchFamily="34" charset="0"/>
               </a:rPr>
               <a:t> </a:t>
             </a:r>
             <a:r>
-              <a:rPr lang="fr-FR" sz="2800" dirty="0" err="1">
+              <a:rPr lang="fr-FR" sz="2000" dirty="0" err="1">
                 <a:latin typeface="Candara" panose="020E0502030303020204" pitchFamily="34" charset="0"/>
               </a:rPr>
-              <a:t>tailored</a:t>
-            </a:r>
-            <a:r>
-              <a:rPr lang="fr-FR" sz="2800" dirty="0">
+              <a:t>cohort</a:t>
+            </a:r>
+            <a:r>
+              <a:rPr lang="fr-FR" sz="2000" dirty="0">
                 <a:latin typeface="Candara" panose="020E0502030303020204" pitchFamily="34" charset="0"/>
               </a:rPr>
-              <a:t> to the </a:t>
-            </a:r>
-            <a:r>
-              <a:rPr lang="fr-FR" sz="2800" dirty="0" err="1">
+              <a:t> size</a:t>
+            </a:r>
+            <a:endParaRPr lang="en-US" sz="2000" dirty="0">
+              <a:latin typeface="Candara" panose="020E0502030303020204" pitchFamily="34" charset="0"/>
+            </a:endParaRPr>
+          </a:p>
+        </p:txBody>
+      </p:sp>
+      <p:sp>
+        <p:nvSpPr>
+          <p:cNvPr id="9" name="TextBox 8">
+            <a:extLst>
+              <a:ext uri="{FF2B5EF4-FFF2-40B4-BE49-F238E27FC236}">
+                <a16:creationId xmlns:a16="http://schemas.microsoft.com/office/drawing/2014/main" id="{9606F1ED-02C4-C5F7-1022-0C23D3E345FC}"/>
+              </a:ext>
+            </a:extLst>
+          </p:cNvPr>
+          <p:cNvSpPr txBox="1"/>
+          <p:nvPr/>
+        </p:nvSpPr>
+        <p:spPr>
+          <a:xfrm>
+            <a:off x="2194560" y="5518307"/>
+            <a:ext cx="7802880" cy="954107"/>
+          </a:xfrm>
+          <a:prstGeom prst="rect">
+            <a:avLst/>
+          </a:prstGeom>
+          <a:noFill/>
+        </p:spPr>
+        <p:txBody>
+          <a:bodyPr wrap="square" rtlCol="0">
+            <a:spAutoFit/>
+          </a:bodyPr>
+          <a:lstStyle/>
+          <a:p>
+            <a:pPr algn="ctr"/>
+            <a:r>
+              <a:rPr lang="fr-FR" sz="2800" b="1" dirty="0">
                 <a:latin typeface="Candara" panose="020E0502030303020204" pitchFamily="34" charset="0"/>
               </a:rPr>
-              <a:t>administration’s</a:t>
-            </a:r>
-            <a:r>
-              <a:rPr lang="fr-FR" sz="2800" dirty="0">
+              <a:t>A system </a:t>
+            </a:r>
+            <a:r>
+              <a:rPr lang="fr-FR" sz="2800" b="1" dirty="0" err="1">
+                <a:latin typeface="Candara" panose="020E0502030303020204" pitchFamily="34" charset="0"/>
+              </a:rPr>
+              <a:t>with</a:t>
+            </a:r>
+            <a:r>
+              <a:rPr lang="fr-FR" sz="2800" b="1" dirty="0">
                 <a:latin typeface="Candara" panose="020E0502030303020204" pitchFamily="34" charset="0"/>
               </a:rPr>
               <a:t> </a:t>
             </a:r>
             <a:r>
-              <a:rPr lang="fr-FR" sz="2800" dirty="0" err="1">
+              <a:rPr lang="fr-FR" sz="2800" b="1" dirty="0" err="1">
                 <a:latin typeface="Candara" panose="020E0502030303020204" pitchFamily="34" charset="0"/>
               </a:rPr>
-              <a:t>needs</a:t>
-            </a:r>
-            <a:r>
-              <a:rPr lang="fr-FR" sz="2800" dirty="0">
+              <a:t>very</a:t>
+            </a:r>
+            <a:r>
+              <a:rPr lang="fr-FR" sz="2800" b="1" dirty="0">
+                <a:latin typeface="Candara" panose="020E0502030303020204" pitchFamily="34" charset="0"/>
+              </a:rPr>
+              <a:t> good </a:t>
+            </a:r>
+            <a:r>
+              <a:rPr lang="fr-FR" sz="2800" b="1" dirty="0" err="1">
+                <a:latin typeface="Candara" panose="020E0502030303020204" pitchFamily="34" charset="0"/>
+              </a:rPr>
+              <a:t>properties</a:t>
+            </a:r>
+            <a:r>
+              <a:rPr lang="fr-FR" sz="2800" b="1" dirty="0">
+                <a:latin typeface="Candara" panose="020E0502030303020204" pitchFamily="34" charset="0"/>
+              </a:rPr>
+              <a:t>,</a:t>
+            </a:r>
+            <a:br>
+              <a:rPr lang="fr-FR" sz="2800" b="1" dirty="0">
+                <a:latin typeface="Candara" panose="020E0502030303020204" pitchFamily="34" charset="0"/>
+              </a:rPr>
+            </a:br>
+            <a:r>
+              <a:rPr lang="fr-FR" sz="2800" b="1" dirty="0" err="1">
+                <a:latin typeface="Candara" panose="020E0502030303020204" pitchFamily="34" charset="0"/>
+              </a:rPr>
+              <a:t>while</a:t>
+            </a:r>
+            <a:r>
+              <a:rPr lang="fr-FR" sz="2800" b="1" dirty="0">
                 <a:latin typeface="Candara" panose="020E0502030303020204" pitchFamily="34" charset="0"/>
               </a:rPr>
               <a:t> </a:t>
             </a:r>
-            <a:endParaRPr lang="en-US" sz="2800" dirty="0">
+            <a:r>
+              <a:rPr lang="fr-FR" sz="2800" b="1" dirty="0" err="1">
+                <a:latin typeface="Candara" panose="020E0502030303020204" pitchFamily="34" charset="0"/>
+              </a:rPr>
+              <a:t>being</a:t>
+            </a:r>
+            <a:r>
+              <a:rPr lang="fr-FR" sz="2800" b="1" dirty="0">
+                <a:latin typeface="Candara" panose="020E0502030303020204" pitchFamily="34" charset="0"/>
+              </a:rPr>
+              <a:t> fast and </a:t>
+            </a:r>
+            <a:r>
+              <a:rPr lang="fr-FR" sz="2800" b="1" dirty="0" err="1">
+                <a:latin typeface="Candara" panose="020E0502030303020204" pitchFamily="34" charset="0"/>
+              </a:rPr>
+              <a:t>with</a:t>
+            </a:r>
+            <a:r>
+              <a:rPr lang="fr-FR" sz="2800" b="1" dirty="0">
+                <a:latin typeface="Candara" panose="020E0502030303020204" pitchFamily="34" charset="0"/>
+              </a:rPr>
+              <a:t> no congestion  </a:t>
+            </a:r>
+            <a:endParaRPr lang="en-US" sz="2800" b="1" dirty="0">
               <a:latin typeface="Candara" panose="020E0502030303020204" pitchFamily="34" charset="0"/>
             </a:endParaRPr>
           </a:p>
@@ -42368,7 +42201,7 @@
     </p:spTree>
     <p:extLst>
       <p:ext uri="{BB962C8B-B14F-4D97-AF65-F5344CB8AC3E}">
-        <p14:creationId xmlns:p14="http://schemas.microsoft.com/office/powerpoint/2010/main" val="296081390"/>
+        <p14:creationId xmlns:p14="http://schemas.microsoft.com/office/powerpoint/2010/main" val="3797878874"/>
       </p:ext>
     </p:extLst>
   </p:cSld>
@@ -42400,7 +42233,7 @@
           <p:cNvPr id="2" name="Title 1">
             <a:extLst>
               <a:ext uri="{FF2B5EF4-FFF2-40B4-BE49-F238E27FC236}">
-                <a16:creationId xmlns:a16="http://schemas.microsoft.com/office/drawing/2014/main" id="{0106FBB4-BBC0-5958-3F1E-0A5C7803AEF8}"/>
+                <a16:creationId xmlns:a16="http://schemas.microsoft.com/office/drawing/2014/main" id="{CCD8C1BE-1835-4197-D93B-0314B44CEF86}"/>
               </a:ext>
             </a:extLst>
           </p:cNvPr>
@@ -42413,14 +42246,633 @@
         </p:nvSpPr>
         <p:spPr/>
         <p:txBody>
+          <a:bodyPr>
+            <a:normAutofit/>
+          </a:bodyPr>
+          <a:lstStyle/>
+          <a:p>
+            <a:r>
+              <a:rPr lang="fr-FR" sz="3600" dirty="0" err="1">
+                <a:latin typeface="Candara" panose="020E0502030303020204" pitchFamily="34" charset="0"/>
+              </a:rPr>
+              <a:t>Other</a:t>
+            </a:r>
+            <a:r>
+              <a:rPr lang="fr-FR" sz="3600" dirty="0">
+                <a:latin typeface="Candara" panose="020E0502030303020204" pitchFamily="34" charset="0"/>
+              </a:rPr>
+              <a:t> </a:t>
+            </a:r>
+            <a:r>
+              <a:rPr lang="fr-FR" sz="3600" dirty="0" err="1">
+                <a:latin typeface="Candara" panose="020E0502030303020204" pitchFamily="34" charset="0"/>
+              </a:rPr>
+              <a:t>Considerations</a:t>
+            </a:r>
+            <a:endParaRPr lang="en-US" sz="3600" dirty="0">
+              <a:latin typeface="Candara" panose="020E0502030303020204" pitchFamily="34" charset="0"/>
+            </a:endParaRPr>
+          </a:p>
+        </p:txBody>
+      </p:sp>
+      <p:sp>
+        <p:nvSpPr>
+          <p:cNvPr id="3" name="Content Placeholder 2">
+            <a:extLst>
+              <a:ext uri="{FF2B5EF4-FFF2-40B4-BE49-F238E27FC236}">
+                <a16:creationId xmlns:a16="http://schemas.microsoft.com/office/drawing/2014/main" id="{DC8B2311-A707-180F-13E9-DC3071D0FC8F}"/>
+              </a:ext>
+            </a:extLst>
+          </p:cNvPr>
+          <p:cNvSpPr>
+            <a:spLocks noGrp="1"/>
+          </p:cNvSpPr>
+          <p:nvPr>
+            <p:ph idx="1"/>
+          </p:nvPr>
+        </p:nvSpPr>
+        <p:spPr>
+          <a:xfrm>
+            <a:off x="685800" y="1902877"/>
+            <a:ext cx="10820400" cy="3443823"/>
+          </a:xfrm>
+        </p:spPr>
+        <p:txBody>
           <a:bodyPr/>
           <a:lstStyle/>
           <a:p>
-            <a:r>
-              <a:rPr lang="fr-FR" dirty="0"/>
+            <a:pPr marL="342900" indent="-342900">
+              <a:lnSpc>
+                <a:spcPct val="200000"/>
+              </a:lnSpc>
+              <a:buFont typeface="Arial" panose="020B0604020202020204" pitchFamily="34" charset="0"/>
+              <a:buChar char="•"/>
+            </a:pPr>
+            <a:r>
+              <a:rPr lang="fr-FR" dirty="0" err="1">
+                <a:latin typeface="Candara" panose="020E0502030303020204" pitchFamily="34" charset="0"/>
+              </a:rPr>
+              <a:t>Improve</a:t>
+            </a:r>
+            <a:r>
+              <a:rPr lang="fr-FR" dirty="0">
+                <a:latin typeface="Candara" panose="020E0502030303020204" pitchFamily="34" charset="0"/>
+              </a:rPr>
+              <a:t> </a:t>
+            </a:r>
+            <a:r>
+              <a:rPr lang="fr-FR" b="1" dirty="0" err="1">
+                <a:latin typeface="Candara" panose="020E0502030303020204" pitchFamily="34" charset="0"/>
+              </a:rPr>
+              <a:t>fairness</a:t>
+            </a:r>
+            <a:r>
+              <a:rPr lang="fr-FR" dirty="0">
+                <a:latin typeface="Candara" panose="020E0502030303020204" pitchFamily="34" charset="0"/>
+              </a:rPr>
+              <a:t> : </a:t>
+            </a:r>
+            <a:r>
+              <a:rPr lang="fr-FR" dirty="0" err="1">
+                <a:latin typeface="Candara" panose="020E0502030303020204" pitchFamily="34" charset="0"/>
+              </a:rPr>
+              <a:t>low</a:t>
+            </a:r>
+            <a:r>
+              <a:rPr lang="fr-FR" dirty="0">
+                <a:latin typeface="Candara" panose="020E0502030303020204" pitchFamily="34" charset="0"/>
+              </a:rPr>
+              <a:t> </a:t>
+            </a:r>
+            <a:r>
+              <a:rPr lang="fr-FR" dirty="0" err="1">
+                <a:latin typeface="Candara" panose="020E0502030303020204" pitchFamily="34" charset="0"/>
+              </a:rPr>
+              <a:t>rank</a:t>
+            </a:r>
+            <a:r>
+              <a:rPr lang="fr-FR" dirty="0">
+                <a:latin typeface="Candara" panose="020E0502030303020204" pitchFamily="34" charset="0"/>
+              </a:rPr>
+              <a:t> </a:t>
+            </a:r>
+            <a:r>
+              <a:rPr lang="fr-FR" dirty="0">
+                <a:latin typeface="Candara" panose="020E0502030303020204" pitchFamily="34" charset="0"/>
+                <a:sym typeface="Wingdings" panose="05000000000000000000" pitchFamily="2" charset="2"/>
+              </a:rPr>
+              <a:t> boost </a:t>
+            </a:r>
+            <a:r>
+              <a:rPr lang="fr-FR" dirty="0" err="1">
+                <a:latin typeface="Candara" panose="020E0502030303020204" pitchFamily="34" charset="0"/>
+                <a:sym typeface="Wingdings" panose="05000000000000000000" pitchFamily="2" charset="2"/>
+              </a:rPr>
+              <a:t>next</a:t>
+            </a:r>
+            <a:r>
+              <a:rPr lang="fr-FR" dirty="0">
+                <a:latin typeface="Candara" panose="020E0502030303020204" pitchFamily="34" charset="0"/>
+                <a:sym typeface="Wingdings" panose="05000000000000000000" pitchFamily="2" charset="2"/>
+              </a:rPr>
+              <a:t> time  (loose </a:t>
+            </a:r>
+            <a:r>
+              <a:rPr lang="fr-FR" dirty="0" err="1">
+                <a:latin typeface="Candara" panose="020E0502030303020204" pitchFamily="34" charset="0"/>
+                <a:sym typeface="Wingdings" panose="05000000000000000000" pitchFamily="2" charset="2"/>
+              </a:rPr>
+              <a:t>strategy</a:t>
+            </a:r>
+            <a:r>
+              <a:rPr lang="fr-FR" dirty="0">
+                <a:latin typeface="Candara" panose="020E0502030303020204" pitchFamily="34" charset="0"/>
+                <a:sym typeface="Wingdings" panose="05000000000000000000" pitchFamily="2" charset="2"/>
+              </a:rPr>
+              <a:t> </a:t>
+            </a:r>
+            <a:r>
+              <a:rPr lang="fr-FR" dirty="0" err="1">
+                <a:latin typeface="Candara" panose="020E0502030303020204" pitchFamily="34" charset="0"/>
+                <a:sym typeface="Wingdings" panose="05000000000000000000" pitchFamily="2" charset="2"/>
+              </a:rPr>
+              <a:t>proofness</a:t>
+            </a:r>
+            <a:r>
+              <a:rPr lang="fr-FR" dirty="0">
+                <a:latin typeface="Candara" panose="020E0502030303020204" pitchFamily="34" charset="0"/>
+                <a:sym typeface="Wingdings" panose="05000000000000000000" pitchFamily="2" charset="2"/>
+              </a:rPr>
+              <a:t>)</a:t>
+            </a:r>
+          </a:p>
+          <a:p>
+            <a:pPr marL="342900" indent="-342900">
+              <a:lnSpc>
+                <a:spcPct val="200000"/>
+              </a:lnSpc>
+              <a:buFont typeface="Arial" panose="020B0604020202020204" pitchFamily="34" charset="0"/>
+              <a:buChar char="•"/>
+            </a:pPr>
+            <a:r>
+              <a:rPr lang="fr-FR" b="1" dirty="0">
+                <a:latin typeface="Candara" panose="020E0502030303020204" pitchFamily="34" charset="0"/>
+                <a:sym typeface="Wingdings" panose="05000000000000000000" pitchFamily="2" charset="2"/>
+              </a:rPr>
+              <a:t>Equipment</a:t>
+            </a:r>
+            <a:r>
+              <a:rPr lang="fr-FR" dirty="0">
+                <a:latin typeface="Candara" panose="020E0502030303020204" pitchFamily="34" charset="0"/>
+                <a:sym typeface="Wingdings" panose="05000000000000000000" pitchFamily="2" charset="2"/>
+              </a:rPr>
+              <a:t> </a:t>
+            </a:r>
+            <a:r>
+              <a:rPr lang="fr-FR" dirty="0" err="1">
+                <a:latin typeface="Candara" panose="020E0502030303020204" pitchFamily="34" charset="0"/>
+                <a:sym typeface="Wingdings" panose="05000000000000000000" pitchFamily="2" charset="2"/>
+              </a:rPr>
+              <a:t>matching</a:t>
+            </a:r>
+            <a:r>
+              <a:rPr lang="fr-FR" dirty="0">
+                <a:latin typeface="Candara" panose="020E0502030303020204" pitchFamily="34" charset="0"/>
+                <a:sym typeface="Wingdings" panose="05000000000000000000" pitchFamily="2" charset="2"/>
+              </a:rPr>
+              <a:t> (loose </a:t>
+            </a:r>
+            <a:r>
+              <a:rPr lang="fr-FR" dirty="0" err="1">
+                <a:latin typeface="Candara" panose="020E0502030303020204" pitchFamily="34" charset="0"/>
+                <a:sym typeface="Wingdings" panose="05000000000000000000" pitchFamily="2" charset="2"/>
+              </a:rPr>
+              <a:t>strategy-proofness</a:t>
+            </a:r>
+            <a:r>
+              <a:rPr lang="fr-FR" dirty="0">
+                <a:latin typeface="Candara" panose="020E0502030303020204" pitchFamily="34" charset="0"/>
+                <a:sym typeface="Wingdings" panose="05000000000000000000" pitchFamily="2" charset="2"/>
+              </a:rPr>
+              <a:t>, and more </a:t>
+            </a:r>
+            <a:r>
+              <a:rPr lang="fr-FR" dirty="0" err="1">
+                <a:latin typeface="Candara" panose="020E0502030303020204" pitchFamily="34" charset="0"/>
+                <a:sym typeface="Wingdings" panose="05000000000000000000" pitchFamily="2" charset="2"/>
+              </a:rPr>
+              <a:t>unmatched</a:t>
+            </a:r>
+            <a:r>
+              <a:rPr lang="fr-FR" dirty="0">
+                <a:latin typeface="Candara" panose="020E0502030303020204" pitchFamily="34" charset="0"/>
+                <a:sym typeface="Wingdings" panose="05000000000000000000" pitchFamily="2" charset="2"/>
+              </a:rPr>
+              <a:t> courses)</a:t>
+            </a:r>
+          </a:p>
+          <a:p>
+            <a:pPr marL="342900" indent="-342900">
+              <a:lnSpc>
+                <a:spcPct val="200000"/>
+              </a:lnSpc>
+              <a:buFont typeface="Arial" panose="020B0604020202020204" pitchFamily="34" charset="0"/>
+              <a:buChar char="•"/>
+            </a:pPr>
+            <a:r>
+              <a:rPr lang="fr-FR" b="1" dirty="0" err="1">
+                <a:latin typeface="Candara" panose="020E0502030303020204" pitchFamily="34" charset="0"/>
+                <a:sym typeface="Wingdings" panose="05000000000000000000" pitchFamily="2" charset="2"/>
+              </a:rPr>
+              <a:t>Proximity</a:t>
+            </a:r>
+            <a:r>
+              <a:rPr lang="fr-FR" dirty="0">
+                <a:latin typeface="Candara" panose="020E0502030303020204" pitchFamily="34" charset="0"/>
+                <a:sym typeface="Wingdings" panose="05000000000000000000" pitchFamily="2" charset="2"/>
+              </a:rPr>
+              <a:t> to </a:t>
+            </a:r>
+            <a:r>
+              <a:rPr lang="fr-FR" dirty="0" err="1">
+                <a:latin typeface="Candara" panose="020E0502030303020204" pitchFamily="34" charset="0"/>
+                <a:sym typeface="Wingdings" panose="05000000000000000000" pitchFamily="2" charset="2"/>
+              </a:rPr>
+              <a:t>labs</a:t>
+            </a:r>
+            <a:r>
+              <a:rPr lang="fr-FR" dirty="0">
+                <a:latin typeface="Candara" panose="020E0502030303020204" pitchFamily="34" charset="0"/>
+                <a:sym typeface="Wingdings" panose="05000000000000000000" pitchFamily="2" charset="2"/>
+              </a:rPr>
+              <a:t>/</a:t>
+            </a:r>
+            <a:r>
+              <a:rPr lang="fr-FR" dirty="0" err="1">
+                <a:latin typeface="Candara" panose="020E0502030303020204" pitchFamily="34" charset="0"/>
+                <a:sym typeface="Wingdings" panose="05000000000000000000" pitchFamily="2" charset="2"/>
+              </a:rPr>
+              <a:t>dorms</a:t>
+            </a:r>
+            <a:r>
+              <a:rPr lang="fr-FR" dirty="0">
+                <a:latin typeface="Candara" panose="020E0502030303020204" pitchFamily="34" charset="0"/>
+                <a:sym typeface="Wingdings" panose="05000000000000000000" pitchFamily="2" charset="2"/>
+              </a:rPr>
+              <a:t> (</a:t>
+            </a:r>
+            <a:r>
+              <a:rPr lang="fr-FR" dirty="0" err="1">
+                <a:latin typeface="Candara" panose="020E0502030303020204" pitchFamily="34" charset="0"/>
+                <a:sym typeface="Wingdings" panose="05000000000000000000" pitchFamily="2" charset="2"/>
+              </a:rPr>
+              <a:t>makes</a:t>
+            </a:r>
+            <a:r>
+              <a:rPr lang="fr-FR" dirty="0">
+                <a:latin typeface="Candara" panose="020E0502030303020204" pitchFamily="34" charset="0"/>
+                <a:sym typeface="Wingdings" panose="05000000000000000000" pitchFamily="2" charset="2"/>
+              </a:rPr>
+              <a:t> </a:t>
+            </a:r>
+            <a:r>
+              <a:rPr lang="fr-FR" dirty="0" err="1">
+                <a:latin typeface="Candara" panose="020E0502030303020204" pitchFamily="34" charset="0"/>
+                <a:sym typeface="Wingdings" panose="05000000000000000000" pitchFamily="2" charset="2"/>
+              </a:rPr>
+              <a:t>stability</a:t>
+            </a:r>
+            <a:r>
+              <a:rPr lang="fr-FR" dirty="0">
+                <a:latin typeface="Candara" panose="020E0502030303020204" pitchFamily="34" charset="0"/>
+                <a:sym typeface="Wingdings" panose="05000000000000000000" pitchFamily="2" charset="2"/>
+              </a:rPr>
+              <a:t> harder, </a:t>
+            </a:r>
+            <a:r>
+              <a:rPr lang="fr-FR" dirty="0" err="1">
+                <a:latin typeface="Candara" panose="020E0502030303020204" pitchFamily="34" charset="0"/>
+                <a:sym typeface="Wingdings" panose="05000000000000000000" pitchFamily="2" charset="2"/>
+              </a:rPr>
+              <a:t>improves</a:t>
+            </a:r>
+            <a:r>
+              <a:rPr lang="fr-FR" dirty="0">
+                <a:latin typeface="Candara" panose="020E0502030303020204" pitchFamily="34" charset="0"/>
+                <a:sym typeface="Wingdings" panose="05000000000000000000" pitchFamily="2" charset="2"/>
+              </a:rPr>
+              <a:t> </a:t>
+            </a:r>
+            <a:r>
+              <a:rPr lang="fr-FR" dirty="0" err="1">
+                <a:latin typeface="Candara" panose="020E0502030303020204" pitchFamily="34" charset="0"/>
+                <a:sym typeface="Wingdings" panose="05000000000000000000" pitchFamily="2" charset="2"/>
+              </a:rPr>
+              <a:t>practical</a:t>
+            </a:r>
+            <a:r>
+              <a:rPr lang="fr-FR" dirty="0">
+                <a:latin typeface="Candara" panose="020E0502030303020204" pitchFamily="34" charset="0"/>
+                <a:sym typeface="Wingdings" panose="05000000000000000000" pitchFamily="2" charset="2"/>
+              </a:rPr>
+              <a:t> </a:t>
+            </a:r>
+            <a:r>
+              <a:rPr lang="fr-FR" dirty="0" err="1">
+                <a:latin typeface="Candara" panose="020E0502030303020204" pitchFamily="34" charset="0"/>
+                <a:sym typeface="Wingdings" panose="05000000000000000000" pitchFamily="2" charset="2"/>
+              </a:rPr>
+              <a:t>usability</a:t>
+            </a:r>
+            <a:r>
+              <a:rPr lang="fr-FR" dirty="0">
+                <a:latin typeface="Candara" panose="020E0502030303020204" pitchFamily="34" charset="0"/>
+                <a:sym typeface="Wingdings" panose="05000000000000000000" pitchFamily="2" charset="2"/>
+              </a:rPr>
+              <a:t>)</a:t>
+            </a:r>
+          </a:p>
+          <a:p>
+            <a:pPr marL="342900" indent="-342900">
+              <a:lnSpc>
+                <a:spcPct val="200000"/>
+              </a:lnSpc>
+              <a:buFont typeface="Arial" panose="020B0604020202020204" pitchFamily="34" charset="0"/>
+              <a:buChar char="•"/>
+            </a:pPr>
+            <a:r>
+              <a:rPr lang="fr-FR" b="1" dirty="0" err="1">
+                <a:latin typeface="Candara" panose="020E0502030303020204" pitchFamily="34" charset="0"/>
+                <a:sym typeface="Wingdings" panose="05000000000000000000" pitchFamily="2" charset="2"/>
+              </a:rPr>
+              <a:t>Include</a:t>
+            </a:r>
+            <a:r>
+              <a:rPr lang="fr-FR" dirty="0">
+                <a:latin typeface="Candara" panose="020E0502030303020204" pitchFamily="34" charset="0"/>
+                <a:sym typeface="Wingdings" panose="05000000000000000000" pitchFamily="2" charset="2"/>
+              </a:rPr>
+              <a:t> </a:t>
+            </a:r>
+            <a:r>
+              <a:rPr lang="fr-FR" dirty="0" err="1">
+                <a:latin typeface="Candara" panose="020E0502030303020204" pitchFamily="34" charset="0"/>
+                <a:sym typeface="Wingdings" panose="05000000000000000000" pitchFamily="2" charset="2"/>
+              </a:rPr>
+              <a:t>timetable</a:t>
+            </a:r>
+            <a:r>
+              <a:rPr lang="fr-FR" dirty="0">
+                <a:latin typeface="Candara" panose="020E0502030303020204" pitchFamily="34" charset="0"/>
+                <a:sym typeface="Wingdings" panose="05000000000000000000" pitchFamily="2" charset="2"/>
+              </a:rPr>
+              <a:t> management (</a:t>
+            </a:r>
+            <a:r>
+              <a:rPr lang="fr-FR" dirty="0" err="1">
+                <a:latin typeface="Candara" panose="020E0502030303020204" pitchFamily="34" charset="0"/>
+                <a:sym typeface="Wingdings" panose="05000000000000000000" pitchFamily="2" charset="2"/>
+              </a:rPr>
+              <a:t>makes</a:t>
+            </a:r>
+            <a:r>
+              <a:rPr lang="fr-FR" dirty="0">
+                <a:latin typeface="Candara" panose="020E0502030303020204" pitchFamily="34" charset="0"/>
+                <a:sym typeface="Wingdings" panose="05000000000000000000" pitchFamily="2" charset="2"/>
+              </a:rPr>
+              <a:t> </a:t>
+            </a:r>
+            <a:r>
+              <a:rPr lang="fr-FR" dirty="0" err="1">
+                <a:latin typeface="Candara" panose="020E0502030303020204" pitchFamily="34" charset="0"/>
+                <a:sym typeface="Wingdings" panose="05000000000000000000" pitchFamily="2" charset="2"/>
+              </a:rPr>
+              <a:t>it</a:t>
+            </a:r>
+            <a:r>
+              <a:rPr lang="fr-FR" dirty="0">
+                <a:latin typeface="Candara" panose="020E0502030303020204" pitchFamily="34" charset="0"/>
+                <a:sym typeface="Wingdings" panose="05000000000000000000" pitchFamily="2" charset="2"/>
+              </a:rPr>
+              <a:t> </a:t>
+            </a:r>
+            <a:r>
+              <a:rPr lang="fr-FR" dirty="0" err="1">
+                <a:latin typeface="Candara" panose="020E0502030303020204" pitchFamily="34" charset="0"/>
+                <a:sym typeface="Wingdings" panose="05000000000000000000" pitchFamily="2" charset="2"/>
+              </a:rPr>
+              <a:t>much</a:t>
+            </a:r>
+            <a:r>
+              <a:rPr lang="fr-FR" dirty="0">
+                <a:latin typeface="Candara" panose="020E0502030303020204" pitchFamily="34" charset="0"/>
+                <a:sym typeface="Wingdings" panose="05000000000000000000" pitchFamily="2" charset="2"/>
+              </a:rPr>
+              <a:t> more </a:t>
+            </a:r>
+            <a:r>
+              <a:rPr lang="fr-FR" dirty="0" err="1">
+                <a:latin typeface="Candara" panose="020E0502030303020204" pitchFamily="34" charset="0"/>
+                <a:sym typeface="Wingdings" panose="05000000000000000000" pitchFamily="2" charset="2"/>
+              </a:rPr>
+              <a:t>complex</a:t>
+            </a:r>
+            <a:r>
+              <a:rPr lang="fr-FR" dirty="0">
+                <a:latin typeface="Candara" panose="020E0502030303020204" pitchFamily="34" charset="0"/>
+                <a:sym typeface="Wingdings" panose="05000000000000000000" pitchFamily="2" charset="2"/>
+              </a:rPr>
+              <a:t>)</a:t>
+            </a:r>
+          </a:p>
+          <a:p>
+            <a:pPr marL="342900" indent="-342900">
+              <a:buFont typeface="Arial" panose="020B0604020202020204" pitchFamily="34" charset="0"/>
+              <a:buChar char="•"/>
+            </a:pPr>
+            <a:endParaRPr lang="fr-FR" dirty="0">
+              <a:latin typeface="Candara" panose="020E0502030303020204" pitchFamily="34" charset="0"/>
+              <a:sym typeface="Wingdings" panose="05000000000000000000" pitchFamily="2" charset="2"/>
+            </a:endParaRPr>
+          </a:p>
+          <a:p>
+            <a:pPr marL="342900" indent="-342900">
+              <a:buFont typeface="Arial" panose="020B0604020202020204" pitchFamily="34" charset="0"/>
+              <a:buChar char="•"/>
+            </a:pPr>
+            <a:endParaRPr lang="fr-FR" dirty="0">
+              <a:latin typeface="Candara" panose="020E0502030303020204" pitchFamily="34" charset="0"/>
+              <a:sym typeface="Wingdings" panose="05000000000000000000" pitchFamily="2" charset="2"/>
+            </a:endParaRPr>
+          </a:p>
+          <a:p>
+            <a:pPr marL="342900" indent="-342900">
+              <a:buFont typeface="Arial" panose="020B0604020202020204" pitchFamily="34" charset="0"/>
+              <a:buChar char="•"/>
+            </a:pPr>
+            <a:endParaRPr lang="fr-FR" dirty="0">
+              <a:latin typeface="Candara" panose="020E0502030303020204" pitchFamily="34" charset="0"/>
+              <a:sym typeface="Wingdings" panose="05000000000000000000" pitchFamily="2" charset="2"/>
+            </a:endParaRPr>
+          </a:p>
+          <a:p>
+            <a:pPr marL="342900" indent="-342900">
+              <a:buFont typeface="Arial" panose="020B0604020202020204" pitchFamily="34" charset="0"/>
+              <a:buChar char="•"/>
+            </a:pPr>
+            <a:endParaRPr lang="en-US" dirty="0">
+              <a:latin typeface="Candara" panose="020E0502030303020204" pitchFamily="34" charset="0"/>
+            </a:endParaRPr>
+          </a:p>
+        </p:txBody>
+      </p:sp>
+      <p:sp>
+        <p:nvSpPr>
+          <p:cNvPr id="4" name="TextBox 3">
+            <a:extLst>
+              <a:ext uri="{FF2B5EF4-FFF2-40B4-BE49-F238E27FC236}">
+                <a16:creationId xmlns:a16="http://schemas.microsoft.com/office/drawing/2014/main" id="{B82C1A50-81DB-E5A9-BFF5-97B1039D748D}"/>
+              </a:ext>
+            </a:extLst>
+          </p:cNvPr>
+          <p:cNvSpPr txBox="1"/>
+          <p:nvPr/>
+        </p:nvSpPr>
+        <p:spPr>
+          <a:xfrm>
+            <a:off x="1552575" y="5692224"/>
+            <a:ext cx="9290050" cy="523220"/>
+          </a:xfrm>
+          <a:prstGeom prst="rect">
+            <a:avLst/>
+          </a:prstGeom>
+          <a:noFill/>
+        </p:spPr>
+        <p:txBody>
+          <a:bodyPr wrap="square" rtlCol="0">
+            <a:spAutoFit/>
+          </a:bodyPr>
+          <a:lstStyle/>
+          <a:p>
+            <a:pPr algn="ctr"/>
+            <a:r>
+              <a:rPr lang="fr-FR" sz="2800" b="1" dirty="0">
+                <a:latin typeface="Candara" panose="020E0502030303020204" pitchFamily="34" charset="0"/>
+              </a:rPr>
+              <a:t>The System can </a:t>
+            </a:r>
+            <a:r>
+              <a:rPr lang="fr-FR" sz="2800" b="1" dirty="0" err="1">
+                <a:latin typeface="Candara" panose="020E0502030303020204" pitchFamily="34" charset="0"/>
+              </a:rPr>
+              <a:t>be</a:t>
+            </a:r>
+            <a:r>
+              <a:rPr lang="fr-FR" sz="2800" b="1" dirty="0">
+                <a:latin typeface="Candara" panose="020E0502030303020204" pitchFamily="34" charset="0"/>
+              </a:rPr>
+              <a:t> </a:t>
+            </a:r>
+            <a:r>
+              <a:rPr lang="fr-FR" sz="2800" b="1" dirty="0" err="1">
+                <a:latin typeface="Candara" panose="020E0502030303020204" pitchFamily="34" charset="0"/>
+              </a:rPr>
+              <a:t>tailored</a:t>
+            </a:r>
+            <a:r>
+              <a:rPr lang="fr-FR" sz="2800" b="1" dirty="0">
+                <a:latin typeface="Candara" panose="020E0502030303020204" pitchFamily="34" charset="0"/>
+              </a:rPr>
+              <a:t> to the </a:t>
+            </a:r>
+            <a:r>
+              <a:rPr lang="fr-FR" sz="2800" b="1" dirty="0" err="1">
+                <a:latin typeface="Candara" panose="020E0502030303020204" pitchFamily="34" charset="0"/>
+              </a:rPr>
+              <a:t>administration’s</a:t>
+            </a:r>
+            <a:r>
+              <a:rPr lang="fr-FR" sz="2800" b="1" dirty="0">
+                <a:latin typeface="Candara" panose="020E0502030303020204" pitchFamily="34" charset="0"/>
+              </a:rPr>
+              <a:t> </a:t>
+            </a:r>
+            <a:r>
+              <a:rPr lang="fr-FR" sz="2800" b="1" dirty="0" err="1">
+                <a:latin typeface="Candara" panose="020E0502030303020204" pitchFamily="34" charset="0"/>
+              </a:rPr>
+              <a:t>needs</a:t>
+            </a:r>
+            <a:r>
+              <a:rPr lang="fr-FR" sz="2800" b="1" dirty="0">
+                <a:latin typeface="Candara" panose="020E0502030303020204" pitchFamily="34" charset="0"/>
+              </a:rPr>
+              <a:t> </a:t>
+            </a:r>
+            <a:endParaRPr lang="en-US" sz="2800" b="1" dirty="0">
+              <a:latin typeface="Candara" panose="020E0502030303020204" pitchFamily="34" charset="0"/>
+            </a:endParaRPr>
+          </a:p>
+        </p:txBody>
+      </p:sp>
+    </p:spTree>
+    <p:extLst>
+      <p:ext uri="{BB962C8B-B14F-4D97-AF65-F5344CB8AC3E}">
+        <p14:creationId xmlns:p14="http://schemas.microsoft.com/office/powerpoint/2010/main" val="296081390"/>
+      </p:ext>
+    </p:extLst>
+  </p:cSld>
+  <p:clrMapOvr>
+    <a:masterClrMapping/>
+  </p:clrMapOvr>
+</p:sld>
+</file>
+
+<file path=ppt/slides/slide8.xml><?xml version="1.0" encoding="utf-8"?>
+<p:sld xmlns:a="http://schemas.openxmlformats.org/drawingml/2006/main" xmlns:r="http://schemas.openxmlformats.org/officeDocument/2006/relationships" xmlns:p="http://schemas.openxmlformats.org/presentationml/2006/main">
+  <p:cSld>
+    <p:spTree>
+      <p:nvGrpSpPr>
+        <p:cNvPr id="1" name=""/>
+        <p:cNvGrpSpPr/>
+        <p:nvPr/>
+      </p:nvGrpSpPr>
+      <p:grpSpPr>
+        <a:xfrm>
+          <a:off x="0" y="0"/>
+          <a:ext cx="0" cy="0"/>
+          <a:chOff x="0" y="0"/>
+          <a:chExt cx="0" cy="0"/>
+        </a:xfrm>
+      </p:grpSpPr>
+      <p:sp>
+        <p:nvSpPr>
+          <p:cNvPr id="2" name="Title 1">
+            <a:extLst>
+              <a:ext uri="{FF2B5EF4-FFF2-40B4-BE49-F238E27FC236}">
+                <a16:creationId xmlns:a16="http://schemas.microsoft.com/office/drawing/2014/main" id="{0106FBB4-BBC0-5958-3F1E-0A5C7803AEF8}"/>
+              </a:ext>
+            </a:extLst>
+          </p:cNvPr>
+          <p:cNvSpPr>
+            <a:spLocks noGrp="1"/>
+          </p:cNvSpPr>
+          <p:nvPr>
+            <p:ph type="title"/>
+          </p:nvPr>
+        </p:nvSpPr>
+        <p:spPr/>
+        <p:txBody>
+          <a:bodyPr>
+            <a:normAutofit/>
+          </a:bodyPr>
+          <a:lstStyle/>
+          <a:p>
+            <a:r>
+              <a:rPr lang="fr-FR" sz="3600" dirty="0"/>
               <a:t>CASTLE : Conclusion</a:t>
             </a:r>
-            <a:endParaRPr lang="en-US" dirty="0"/>
+            <a:endParaRPr lang="en-US" sz="3600" dirty="0"/>
           </a:p>
         </p:txBody>
       </p:sp>

</xml_diff>